<commit_message>
Three sketches done for Twitter
</commit_message>
<xml_diff>
--- a/sketchbook.pptx
+++ b/sketchbook.pptx
@@ -14,6 +14,9 @@
     <p:sldId id="261" r:id="rId8"/>
     <p:sldId id="262" r:id="rId9"/>
     <p:sldId id="263" r:id="rId10"/>
+    <p:sldId id="265" r:id="rId11"/>
+    <p:sldId id="266" r:id="rId12"/>
+    <p:sldId id="267" r:id="rId13"/>
   </p:sldIdLst>
   <p:sldSz cx="9144000" cy="6858000" type="screen4x3"/>
   <p:notesSz cx="6858000" cy="9144000"/>
@@ -296,7 +299,8 @@
           <a:p>
             <a:fld id="{54D51C8F-29A5-40B1-B56C-20C15425DA5B}" type="datetimeFigureOut">
               <a:rPr lang="en-CA" smtClean="0"/>
-              <a:t>2014-01-06</a:t>
+              <a:pPr/>
+              <a:t>2014-01-08</a:t>
             </a:fld>
             <a:endParaRPr lang="en-CA"/>
           </a:p>
@@ -338,6 +342,7 @@
           <a:p>
             <a:fld id="{BD389E2C-0D79-46DB-81D9-6374A7A28B1C}" type="slidenum">
               <a:rPr lang="en-CA" smtClean="0"/>
+              <a:pPr/>
               <a:t>‹#›</a:t>
             </a:fld>
             <a:endParaRPr lang="en-CA"/>
@@ -461,7 +466,8 @@
           <a:p>
             <a:fld id="{54D51C8F-29A5-40B1-B56C-20C15425DA5B}" type="datetimeFigureOut">
               <a:rPr lang="en-CA" smtClean="0"/>
-              <a:t>2014-01-06</a:t>
+              <a:pPr/>
+              <a:t>2014-01-08</a:t>
             </a:fld>
             <a:endParaRPr lang="en-CA"/>
           </a:p>
@@ -503,6 +509,7 @@
           <a:p>
             <a:fld id="{BD389E2C-0D79-46DB-81D9-6374A7A28B1C}" type="slidenum">
               <a:rPr lang="en-CA" smtClean="0"/>
+              <a:pPr/>
               <a:t>‹#›</a:t>
             </a:fld>
             <a:endParaRPr lang="en-CA"/>
@@ -636,7 +643,8 @@
           <a:p>
             <a:fld id="{54D51C8F-29A5-40B1-B56C-20C15425DA5B}" type="datetimeFigureOut">
               <a:rPr lang="en-CA" smtClean="0"/>
-              <a:t>2014-01-06</a:t>
+              <a:pPr/>
+              <a:t>2014-01-08</a:t>
             </a:fld>
             <a:endParaRPr lang="en-CA"/>
           </a:p>
@@ -678,6 +686,7 @@
           <a:p>
             <a:fld id="{BD389E2C-0D79-46DB-81D9-6374A7A28B1C}" type="slidenum">
               <a:rPr lang="en-CA" smtClean="0"/>
+              <a:pPr/>
               <a:t>‹#›</a:t>
             </a:fld>
             <a:endParaRPr lang="en-CA"/>
@@ -801,7 +810,8 @@
           <a:p>
             <a:fld id="{54D51C8F-29A5-40B1-B56C-20C15425DA5B}" type="datetimeFigureOut">
               <a:rPr lang="en-CA" smtClean="0"/>
-              <a:t>2014-01-06</a:t>
+              <a:pPr/>
+              <a:t>2014-01-08</a:t>
             </a:fld>
             <a:endParaRPr lang="en-CA"/>
           </a:p>
@@ -843,6 +853,7 @@
           <a:p>
             <a:fld id="{BD389E2C-0D79-46DB-81D9-6374A7A28B1C}" type="slidenum">
               <a:rPr lang="en-CA" smtClean="0"/>
+              <a:pPr/>
               <a:t>‹#›</a:t>
             </a:fld>
             <a:endParaRPr lang="en-CA"/>
@@ -1042,7 +1053,8 @@
           <a:p>
             <a:fld id="{54D51C8F-29A5-40B1-B56C-20C15425DA5B}" type="datetimeFigureOut">
               <a:rPr lang="en-CA" smtClean="0"/>
-              <a:t>2014-01-06</a:t>
+              <a:pPr/>
+              <a:t>2014-01-08</a:t>
             </a:fld>
             <a:endParaRPr lang="en-CA"/>
           </a:p>
@@ -1084,6 +1096,7 @@
           <a:p>
             <a:fld id="{BD389E2C-0D79-46DB-81D9-6374A7A28B1C}" type="slidenum">
               <a:rPr lang="en-CA" smtClean="0"/>
+              <a:pPr/>
               <a:t>‹#›</a:t>
             </a:fld>
             <a:endParaRPr lang="en-CA"/>
@@ -1325,7 +1338,8 @@
           <a:p>
             <a:fld id="{54D51C8F-29A5-40B1-B56C-20C15425DA5B}" type="datetimeFigureOut">
               <a:rPr lang="en-CA" smtClean="0"/>
-              <a:t>2014-01-06</a:t>
+              <a:pPr/>
+              <a:t>2014-01-08</a:t>
             </a:fld>
             <a:endParaRPr lang="en-CA"/>
           </a:p>
@@ -1367,6 +1381,7 @@
           <a:p>
             <a:fld id="{BD389E2C-0D79-46DB-81D9-6374A7A28B1C}" type="slidenum">
               <a:rPr lang="en-CA" smtClean="0"/>
+              <a:pPr/>
               <a:t>‹#›</a:t>
             </a:fld>
             <a:endParaRPr lang="en-CA"/>
@@ -1742,7 +1757,8 @@
           <a:p>
             <a:fld id="{54D51C8F-29A5-40B1-B56C-20C15425DA5B}" type="datetimeFigureOut">
               <a:rPr lang="en-CA" smtClean="0"/>
-              <a:t>2014-01-06</a:t>
+              <a:pPr/>
+              <a:t>2014-01-08</a:t>
             </a:fld>
             <a:endParaRPr lang="en-CA"/>
           </a:p>
@@ -1784,6 +1800,7 @@
           <a:p>
             <a:fld id="{BD389E2C-0D79-46DB-81D9-6374A7A28B1C}" type="slidenum">
               <a:rPr lang="en-CA" smtClean="0"/>
+              <a:pPr/>
               <a:t>‹#›</a:t>
             </a:fld>
             <a:endParaRPr lang="en-CA"/>
@@ -1855,7 +1872,8 @@
           <a:p>
             <a:fld id="{54D51C8F-29A5-40B1-B56C-20C15425DA5B}" type="datetimeFigureOut">
               <a:rPr lang="en-CA" smtClean="0"/>
-              <a:t>2014-01-06</a:t>
+              <a:pPr/>
+              <a:t>2014-01-08</a:t>
             </a:fld>
             <a:endParaRPr lang="en-CA"/>
           </a:p>
@@ -1897,6 +1915,7 @@
           <a:p>
             <a:fld id="{BD389E2C-0D79-46DB-81D9-6374A7A28B1C}" type="slidenum">
               <a:rPr lang="en-CA" smtClean="0"/>
+              <a:pPr/>
               <a:t>‹#›</a:t>
             </a:fld>
             <a:endParaRPr lang="en-CA"/>
@@ -1945,7 +1964,8 @@
           <a:p>
             <a:fld id="{54D51C8F-29A5-40B1-B56C-20C15425DA5B}" type="datetimeFigureOut">
               <a:rPr lang="en-CA" smtClean="0"/>
-              <a:t>2014-01-06</a:t>
+              <a:pPr/>
+              <a:t>2014-01-08</a:t>
             </a:fld>
             <a:endParaRPr lang="en-CA"/>
           </a:p>
@@ -1987,6 +2007,7 @@
           <a:p>
             <a:fld id="{BD389E2C-0D79-46DB-81D9-6374A7A28B1C}" type="slidenum">
               <a:rPr lang="en-CA" smtClean="0"/>
+              <a:pPr/>
               <a:t>‹#›</a:t>
             </a:fld>
             <a:endParaRPr lang="en-CA"/>
@@ -2217,7 +2238,8 @@
           <a:p>
             <a:fld id="{54D51C8F-29A5-40B1-B56C-20C15425DA5B}" type="datetimeFigureOut">
               <a:rPr lang="en-CA" smtClean="0"/>
-              <a:t>2014-01-06</a:t>
+              <a:pPr/>
+              <a:t>2014-01-08</a:t>
             </a:fld>
             <a:endParaRPr lang="en-CA"/>
           </a:p>
@@ -2259,6 +2281,7 @@
           <a:p>
             <a:fld id="{BD389E2C-0D79-46DB-81D9-6374A7A28B1C}" type="slidenum">
               <a:rPr lang="en-CA" smtClean="0"/>
+              <a:pPr/>
               <a:t>‹#›</a:t>
             </a:fld>
             <a:endParaRPr lang="en-CA"/>
@@ -2465,7 +2488,8 @@
           <a:p>
             <a:fld id="{54D51C8F-29A5-40B1-B56C-20C15425DA5B}" type="datetimeFigureOut">
               <a:rPr lang="en-CA" smtClean="0"/>
-              <a:t>2014-01-06</a:t>
+              <a:pPr/>
+              <a:t>2014-01-08</a:t>
             </a:fld>
             <a:endParaRPr lang="en-CA"/>
           </a:p>
@@ -2507,6 +2531,7 @@
           <a:p>
             <a:fld id="{BD389E2C-0D79-46DB-81D9-6374A7A28B1C}" type="slidenum">
               <a:rPr lang="en-CA" smtClean="0"/>
+              <a:pPr/>
               <a:t>‹#›</a:t>
             </a:fld>
             <a:endParaRPr lang="en-CA"/>
@@ -2673,7 +2698,8 @@
           <a:p>
             <a:fld id="{54D51C8F-29A5-40B1-B56C-20C15425DA5B}" type="datetimeFigureOut">
               <a:rPr lang="en-CA" smtClean="0"/>
-              <a:t>2014-01-06</a:t>
+              <a:pPr/>
+              <a:t>2014-01-08</a:t>
             </a:fld>
             <a:endParaRPr lang="en-CA"/>
           </a:p>
@@ -2751,6 +2777,7 @@
           <a:p>
             <a:fld id="{BD389E2C-0D79-46DB-81D9-6374A7A28B1C}" type="slidenum">
               <a:rPr lang="en-CA" smtClean="0"/>
+              <a:pPr/>
               <a:t>‹#›</a:t>
             </a:fld>
             <a:endParaRPr lang="en-CA"/>
@@ -3127,6 +3154,102 @@
   <p:clrMapOvr>
     <a:masterClrMapping/>
   </p:clrMapOvr>
+</p:sld>
+</file>
+
+<file path=ppt/slides/slide10.xml><?xml version="1.0" encoding="utf-8"?>
+<p:sld xmlns:a="http://schemas.openxmlformats.org/drawingml/2006/main" xmlns:r="http://schemas.openxmlformats.org/officeDocument/2006/relationships" xmlns:p="http://schemas.openxmlformats.org/presentationml/2006/main">
+  <p:cSld>
+    <p:spTree>
+      <p:nvGrpSpPr>
+        <p:cNvPr id="1" name=""/>
+        <p:cNvGrpSpPr/>
+        <p:nvPr/>
+      </p:nvGrpSpPr>
+      <p:grpSpPr>
+        <a:xfrm>
+          <a:off x="0" y="0"/>
+          <a:ext cx="0" cy="0"/>
+          <a:chOff x="0" y="0"/>
+          <a:chExt cx="0" cy="0"/>
+        </a:xfrm>
+      </p:grpSpPr>
+    </p:spTree>
+  </p:cSld>
+  <p:clrMapOvr>
+    <a:masterClrMapping/>
+  </p:clrMapOvr>
+  <p:timing>
+    <p:tnLst>
+      <p:par>
+        <p:cTn id="1" dur="indefinite" restart="never" nodeType="tmRoot"/>
+      </p:par>
+    </p:tnLst>
+  </p:timing>
+</p:sld>
+</file>
+
+<file path=ppt/slides/slide11.xml><?xml version="1.0" encoding="utf-8"?>
+<p:sld xmlns:a="http://schemas.openxmlformats.org/drawingml/2006/main" xmlns:r="http://schemas.openxmlformats.org/officeDocument/2006/relationships" xmlns:p="http://schemas.openxmlformats.org/presentationml/2006/main">
+  <p:cSld>
+    <p:spTree>
+      <p:nvGrpSpPr>
+        <p:cNvPr id="1" name=""/>
+        <p:cNvGrpSpPr/>
+        <p:nvPr/>
+      </p:nvGrpSpPr>
+      <p:grpSpPr>
+        <a:xfrm>
+          <a:off x="0" y="0"/>
+          <a:ext cx="0" cy="0"/>
+          <a:chOff x="0" y="0"/>
+          <a:chExt cx="0" cy="0"/>
+        </a:xfrm>
+      </p:grpSpPr>
+    </p:spTree>
+  </p:cSld>
+  <p:clrMapOvr>
+    <a:masterClrMapping/>
+  </p:clrMapOvr>
+  <p:timing>
+    <p:tnLst>
+      <p:par>
+        <p:cTn id="1" dur="indefinite" restart="never" nodeType="tmRoot"/>
+      </p:par>
+    </p:tnLst>
+  </p:timing>
+</p:sld>
+</file>
+
+<file path=ppt/slides/slide12.xml><?xml version="1.0" encoding="utf-8"?>
+<p:sld xmlns:a="http://schemas.openxmlformats.org/drawingml/2006/main" xmlns:r="http://schemas.openxmlformats.org/officeDocument/2006/relationships" xmlns:p="http://schemas.openxmlformats.org/presentationml/2006/main">
+  <p:cSld>
+    <p:spTree>
+      <p:nvGrpSpPr>
+        <p:cNvPr id="1" name=""/>
+        <p:cNvGrpSpPr/>
+        <p:nvPr/>
+      </p:nvGrpSpPr>
+      <p:grpSpPr>
+        <a:xfrm>
+          <a:off x="0" y="0"/>
+          <a:ext cx="0" cy="0"/>
+          <a:chOff x="0" y="0"/>
+          <a:chExt cx="0" cy="0"/>
+        </a:xfrm>
+      </p:grpSpPr>
+    </p:spTree>
+  </p:cSld>
+  <p:clrMapOvr>
+    <a:masterClrMapping/>
+  </p:clrMapOvr>
+  <p:timing>
+    <p:tnLst>
+      <p:par>
+        <p:cTn id="1" dur="indefinite" restart="never" nodeType="tmRoot"/>
+      </p:par>
+    </p:tnLst>
+  </p:timing>
 </p:sld>
 </file>
 

</xml_diff>

<commit_message>
More drawings (Previously seen on Twitter)
</commit_message>
<xml_diff>
--- a/sketchbook.pptx
+++ b/sketchbook.pptx
@@ -17,6 +17,14 @@
     <p:sldId id="265" r:id="rId11"/>
     <p:sldId id="266" r:id="rId12"/>
     <p:sldId id="267" r:id="rId13"/>
+    <p:sldId id="268" r:id="rId14"/>
+    <p:sldId id="269" r:id="rId15"/>
+    <p:sldId id="270" r:id="rId16"/>
+    <p:sldId id="271" r:id="rId17"/>
+    <p:sldId id="272" r:id="rId18"/>
+    <p:sldId id="273" r:id="rId19"/>
+    <p:sldId id="274" r:id="rId20"/>
+    <p:sldId id="275" r:id="rId21"/>
   </p:sldIdLst>
   <p:sldSz cx="9144000" cy="6858000" type="screen4x3"/>
   <p:notesSz cx="6858000" cy="9144000"/>
@@ -300,7 +308,7 @@
             <a:fld id="{54D51C8F-29A5-40B1-B56C-20C15425DA5B}" type="datetimeFigureOut">
               <a:rPr lang="en-CA" smtClean="0"/>
               <a:pPr/>
-              <a:t>2014-01-08</a:t>
+              <a:t>2014-01-12</a:t>
             </a:fld>
             <a:endParaRPr lang="en-CA"/>
           </a:p>
@@ -467,7 +475,7 @@
             <a:fld id="{54D51C8F-29A5-40B1-B56C-20C15425DA5B}" type="datetimeFigureOut">
               <a:rPr lang="en-CA" smtClean="0"/>
               <a:pPr/>
-              <a:t>2014-01-08</a:t>
+              <a:t>2014-01-12</a:t>
             </a:fld>
             <a:endParaRPr lang="en-CA"/>
           </a:p>
@@ -644,7 +652,7 @@
             <a:fld id="{54D51C8F-29A5-40B1-B56C-20C15425DA5B}" type="datetimeFigureOut">
               <a:rPr lang="en-CA" smtClean="0"/>
               <a:pPr/>
-              <a:t>2014-01-08</a:t>
+              <a:t>2014-01-12</a:t>
             </a:fld>
             <a:endParaRPr lang="en-CA"/>
           </a:p>
@@ -811,7 +819,7 @@
             <a:fld id="{54D51C8F-29A5-40B1-B56C-20C15425DA5B}" type="datetimeFigureOut">
               <a:rPr lang="en-CA" smtClean="0"/>
               <a:pPr/>
-              <a:t>2014-01-08</a:t>
+              <a:t>2014-01-12</a:t>
             </a:fld>
             <a:endParaRPr lang="en-CA"/>
           </a:p>
@@ -1054,7 +1062,7 @@
             <a:fld id="{54D51C8F-29A5-40B1-B56C-20C15425DA5B}" type="datetimeFigureOut">
               <a:rPr lang="en-CA" smtClean="0"/>
               <a:pPr/>
-              <a:t>2014-01-08</a:t>
+              <a:t>2014-01-12</a:t>
             </a:fld>
             <a:endParaRPr lang="en-CA"/>
           </a:p>
@@ -1339,7 +1347,7 @@
             <a:fld id="{54D51C8F-29A5-40B1-B56C-20C15425DA5B}" type="datetimeFigureOut">
               <a:rPr lang="en-CA" smtClean="0"/>
               <a:pPr/>
-              <a:t>2014-01-08</a:t>
+              <a:t>2014-01-12</a:t>
             </a:fld>
             <a:endParaRPr lang="en-CA"/>
           </a:p>
@@ -1758,7 +1766,7 @@
             <a:fld id="{54D51C8F-29A5-40B1-B56C-20C15425DA5B}" type="datetimeFigureOut">
               <a:rPr lang="en-CA" smtClean="0"/>
               <a:pPr/>
-              <a:t>2014-01-08</a:t>
+              <a:t>2014-01-12</a:t>
             </a:fld>
             <a:endParaRPr lang="en-CA"/>
           </a:p>
@@ -1873,7 +1881,7 @@
             <a:fld id="{54D51C8F-29A5-40B1-B56C-20C15425DA5B}" type="datetimeFigureOut">
               <a:rPr lang="en-CA" smtClean="0"/>
               <a:pPr/>
-              <a:t>2014-01-08</a:t>
+              <a:t>2014-01-12</a:t>
             </a:fld>
             <a:endParaRPr lang="en-CA"/>
           </a:p>
@@ -1965,7 +1973,7 @@
             <a:fld id="{54D51C8F-29A5-40B1-B56C-20C15425DA5B}" type="datetimeFigureOut">
               <a:rPr lang="en-CA" smtClean="0"/>
               <a:pPr/>
-              <a:t>2014-01-08</a:t>
+              <a:t>2014-01-12</a:t>
             </a:fld>
             <a:endParaRPr lang="en-CA"/>
           </a:p>
@@ -2239,7 +2247,7 @@
             <a:fld id="{54D51C8F-29A5-40B1-B56C-20C15425DA5B}" type="datetimeFigureOut">
               <a:rPr lang="en-CA" smtClean="0"/>
               <a:pPr/>
-              <a:t>2014-01-08</a:t>
+              <a:t>2014-01-12</a:t>
             </a:fld>
             <a:endParaRPr lang="en-CA"/>
           </a:p>
@@ -2489,7 +2497,7 @@
             <a:fld id="{54D51C8F-29A5-40B1-B56C-20C15425DA5B}" type="datetimeFigureOut">
               <a:rPr lang="en-CA" smtClean="0"/>
               <a:pPr/>
-              <a:t>2014-01-08</a:t>
+              <a:t>2014-01-12</a:t>
             </a:fld>
             <a:endParaRPr lang="en-CA"/>
           </a:p>
@@ -2699,7 +2707,7 @@
             <a:fld id="{54D51C8F-29A5-40B1-B56C-20C15425DA5B}" type="datetimeFigureOut">
               <a:rPr lang="en-CA" smtClean="0"/>
               <a:pPr/>
-              <a:t>2014-01-08</a:t>
+              <a:t>2014-01-12</a:t>
             </a:fld>
             <a:endParaRPr lang="en-CA"/>
           </a:p>
@@ -3154,6 +3162,13 @@
   <p:clrMapOvr>
     <a:masterClrMapping/>
   </p:clrMapOvr>
+  <p:timing>
+    <p:tnLst>
+      <p:par>
+        <p:cTn id="1" dur="indefinite" restart="never" nodeType="tmRoot"/>
+      </p:par>
+    </p:tnLst>
+  </p:timing>
 </p:sld>
 </file>
 
@@ -3253,7 +3268,263 @@
 </p:sld>
 </file>
 
+<file path=ppt/slides/slide13.xml><?xml version="1.0" encoding="utf-8"?>
+<p:sld xmlns:a="http://schemas.openxmlformats.org/drawingml/2006/main" xmlns:r="http://schemas.openxmlformats.org/officeDocument/2006/relationships" xmlns:p="http://schemas.openxmlformats.org/presentationml/2006/main">
+  <p:cSld>
+    <p:spTree>
+      <p:nvGrpSpPr>
+        <p:cNvPr id="1" name=""/>
+        <p:cNvGrpSpPr/>
+        <p:nvPr/>
+      </p:nvGrpSpPr>
+      <p:grpSpPr>
+        <a:xfrm>
+          <a:off x="0" y="0"/>
+          <a:ext cx="0" cy="0"/>
+          <a:chOff x="0" y="0"/>
+          <a:chExt cx="0" cy="0"/>
+        </a:xfrm>
+      </p:grpSpPr>
+    </p:spTree>
+  </p:cSld>
+  <p:clrMapOvr>
+    <a:masterClrMapping/>
+  </p:clrMapOvr>
+  <p:timing>
+    <p:tnLst>
+      <p:par>
+        <p:cTn id="1" dur="indefinite" restart="never" nodeType="tmRoot"/>
+      </p:par>
+    </p:tnLst>
+  </p:timing>
+</p:sld>
+</file>
+
+<file path=ppt/slides/slide14.xml><?xml version="1.0" encoding="utf-8"?>
+<p:sld xmlns:a="http://schemas.openxmlformats.org/drawingml/2006/main" xmlns:r="http://schemas.openxmlformats.org/officeDocument/2006/relationships" xmlns:p="http://schemas.openxmlformats.org/presentationml/2006/main">
+  <p:cSld>
+    <p:spTree>
+      <p:nvGrpSpPr>
+        <p:cNvPr id="1" name=""/>
+        <p:cNvGrpSpPr/>
+        <p:nvPr/>
+      </p:nvGrpSpPr>
+      <p:grpSpPr>
+        <a:xfrm>
+          <a:off x="0" y="0"/>
+          <a:ext cx="0" cy="0"/>
+          <a:chOff x="0" y="0"/>
+          <a:chExt cx="0" cy="0"/>
+        </a:xfrm>
+      </p:grpSpPr>
+    </p:spTree>
+  </p:cSld>
+  <p:clrMapOvr>
+    <a:masterClrMapping/>
+  </p:clrMapOvr>
+  <p:timing>
+    <p:tnLst>
+      <p:par>
+        <p:cTn id="1" dur="indefinite" restart="never" nodeType="tmRoot"/>
+      </p:par>
+    </p:tnLst>
+  </p:timing>
+</p:sld>
+</file>
+
+<file path=ppt/slides/slide15.xml><?xml version="1.0" encoding="utf-8"?>
+<p:sld xmlns:a="http://schemas.openxmlformats.org/drawingml/2006/main" xmlns:r="http://schemas.openxmlformats.org/officeDocument/2006/relationships" xmlns:p="http://schemas.openxmlformats.org/presentationml/2006/main">
+  <p:cSld>
+    <p:spTree>
+      <p:nvGrpSpPr>
+        <p:cNvPr id="1" name=""/>
+        <p:cNvGrpSpPr/>
+        <p:nvPr/>
+      </p:nvGrpSpPr>
+      <p:grpSpPr>
+        <a:xfrm>
+          <a:off x="0" y="0"/>
+          <a:ext cx="0" cy="0"/>
+          <a:chOff x="0" y="0"/>
+          <a:chExt cx="0" cy="0"/>
+        </a:xfrm>
+      </p:grpSpPr>
+    </p:spTree>
+  </p:cSld>
+  <p:clrMapOvr>
+    <a:masterClrMapping/>
+  </p:clrMapOvr>
+  <p:timing>
+    <p:tnLst>
+      <p:par>
+        <p:cTn id="1" dur="indefinite" restart="never" nodeType="tmRoot"/>
+      </p:par>
+    </p:tnLst>
+  </p:timing>
+</p:sld>
+</file>
+
+<file path=ppt/slides/slide16.xml><?xml version="1.0" encoding="utf-8"?>
+<p:sld xmlns:a="http://schemas.openxmlformats.org/drawingml/2006/main" xmlns:r="http://schemas.openxmlformats.org/officeDocument/2006/relationships" xmlns:p="http://schemas.openxmlformats.org/presentationml/2006/main">
+  <p:cSld>
+    <p:spTree>
+      <p:nvGrpSpPr>
+        <p:cNvPr id="1" name=""/>
+        <p:cNvGrpSpPr/>
+        <p:nvPr/>
+      </p:nvGrpSpPr>
+      <p:grpSpPr>
+        <a:xfrm>
+          <a:off x="0" y="0"/>
+          <a:ext cx="0" cy="0"/>
+          <a:chOff x="0" y="0"/>
+          <a:chExt cx="0" cy="0"/>
+        </a:xfrm>
+      </p:grpSpPr>
+    </p:spTree>
+  </p:cSld>
+  <p:clrMapOvr>
+    <a:masterClrMapping/>
+  </p:clrMapOvr>
+  <p:timing>
+    <p:tnLst>
+      <p:par>
+        <p:cTn id="1" dur="indefinite" restart="never" nodeType="tmRoot"/>
+      </p:par>
+    </p:tnLst>
+  </p:timing>
+</p:sld>
+</file>
+
+<file path=ppt/slides/slide17.xml><?xml version="1.0" encoding="utf-8"?>
+<p:sld xmlns:a="http://schemas.openxmlformats.org/drawingml/2006/main" xmlns:r="http://schemas.openxmlformats.org/officeDocument/2006/relationships" xmlns:p="http://schemas.openxmlformats.org/presentationml/2006/main">
+  <p:cSld>
+    <p:spTree>
+      <p:nvGrpSpPr>
+        <p:cNvPr id="1" name=""/>
+        <p:cNvGrpSpPr/>
+        <p:nvPr/>
+      </p:nvGrpSpPr>
+      <p:grpSpPr>
+        <a:xfrm>
+          <a:off x="0" y="0"/>
+          <a:ext cx="0" cy="0"/>
+          <a:chOff x="0" y="0"/>
+          <a:chExt cx="0" cy="0"/>
+        </a:xfrm>
+      </p:grpSpPr>
+    </p:spTree>
+  </p:cSld>
+  <p:clrMapOvr>
+    <a:masterClrMapping/>
+  </p:clrMapOvr>
+  <p:timing>
+    <p:tnLst>
+      <p:par>
+        <p:cTn id="1" dur="indefinite" restart="never" nodeType="tmRoot"/>
+      </p:par>
+    </p:tnLst>
+  </p:timing>
+</p:sld>
+</file>
+
+<file path=ppt/slides/slide18.xml><?xml version="1.0" encoding="utf-8"?>
+<p:sld xmlns:a="http://schemas.openxmlformats.org/drawingml/2006/main" xmlns:r="http://schemas.openxmlformats.org/officeDocument/2006/relationships" xmlns:p="http://schemas.openxmlformats.org/presentationml/2006/main">
+  <p:cSld>
+    <p:spTree>
+      <p:nvGrpSpPr>
+        <p:cNvPr id="1" name=""/>
+        <p:cNvGrpSpPr/>
+        <p:nvPr/>
+      </p:nvGrpSpPr>
+      <p:grpSpPr>
+        <a:xfrm>
+          <a:off x="0" y="0"/>
+          <a:ext cx="0" cy="0"/>
+          <a:chOff x="0" y="0"/>
+          <a:chExt cx="0" cy="0"/>
+        </a:xfrm>
+      </p:grpSpPr>
+    </p:spTree>
+  </p:cSld>
+  <p:clrMapOvr>
+    <a:masterClrMapping/>
+  </p:clrMapOvr>
+  <p:timing>
+    <p:tnLst>
+      <p:par>
+        <p:cTn id="1" dur="indefinite" restart="never" nodeType="tmRoot"/>
+      </p:par>
+    </p:tnLst>
+  </p:timing>
+</p:sld>
+</file>
+
+<file path=ppt/slides/slide19.xml><?xml version="1.0" encoding="utf-8"?>
+<p:sld xmlns:a="http://schemas.openxmlformats.org/drawingml/2006/main" xmlns:r="http://schemas.openxmlformats.org/officeDocument/2006/relationships" xmlns:p="http://schemas.openxmlformats.org/presentationml/2006/main">
+  <p:cSld>
+    <p:spTree>
+      <p:nvGrpSpPr>
+        <p:cNvPr id="1" name=""/>
+        <p:cNvGrpSpPr/>
+        <p:nvPr/>
+      </p:nvGrpSpPr>
+      <p:grpSpPr>
+        <a:xfrm>
+          <a:off x="0" y="0"/>
+          <a:ext cx="0" cy="0"/>
+          <a:chOff x="0" y="0"/>
+          <a:chExt cx="0" cy="0"/>
+        </a:xfrm>
+      </p:grpSpPr>
+    </p:spTree>
+  </p:cSld>
+  <p:clrMapOvr>
+    <a:masterClrMapping/>
+  </p:clrMapOvr>
+  <p:timing>
+    <p:tnLst>
+      <p:par>
+        <p:cTn id="1" dur="indefinite" restart="never" nodeType="tmRoot"/>
+      </p:par>
+    </p:tnLst>
+  </p:timing>
+</p:sld>
+</file>
+
 <file path=ppt/slides/slide2.xml><?xml version="1.0" encoding="utf-8"?>
+<p:sld xmlns:a="http://schemas.openxmlformats.org/drawingml/2006/main" xmlns:r="http://schemas.openxmlformats.org/officeDocument/2006/relationships" xmlns:p="http://schemas.openxmlformats.org/presentationml/2006/main">
+  <p:cSld>
+    <p:spTree>
+      <p:nvGrpSpPr>
+        <p:cNvPr id="1" name=""/>
+        <p:cNvGrpSpPr/>
+        <p:nvPr/>
+      </p:nvGrpSpPr>
+      <p:grpSpPr>
+        <a:xfrm>
+          <a:off x="0" y="0"/>
+          <a:ext cx="0" cy="0"/>
+          <a:chOff x="0" y="0"/>
+          <a:chExt cx="0" cy="0"/>
+        </a:xfrm>
+      </p:grpSpPr>
+    </p:spTree>
+  </p:cSld>
+  <p:clrMapOvr>
+    <a:masterClrMapping/>
+  </p:clrMapOvr>
+  <p:timing>
+    <p:tnLst>
+      <p:par>
+        <p:cTn id="1" dur="indefinite" restart="never" nodeType="tmRoot"/>
+      </p:par>
+    </p:tnLst>
+  </p:timing>
+</p:sld>
+</file>
+
+<file path=ppt/slides/slide20.xml><?xml version="1.0" encoding="utf-8"?>
 <p:sld xmlns:a="http://schemas.openxmlformats.org/drawingml/2006/main" xmlns:r="http://schemas.openxmlformats.org/officeDocument/2006/relationships" xmlns:p="http://schemas.openxmlformats.org/presentationml/2006/main">
   <p:cSld>
     <p:spTree>

</xml_diff>

<commit_message>
Flat rabbit, sprite can, and potato
</commit_message>
<xml_diff>
--- a/sketchbook.pptx
+++ b/sketchbook.pptx
@@ -25,6 +25,9 @@
     <p:sldId id="273" r:id="rId19"/>
     <p:sldId id="274" r:id="rId20"/>
     <p:sldId id="275" r:id="rId21"/>
+    <p:sldId id="276" r:id="rId22"/>
+    <p:sldId id="277" r:id="rId23"/>
+    <p:sldId id="278" r:id="rId24"/>
   </p:sldIdLst>
   <p:sldSz cx="9144000" cy="6858000" type="screen4x3"/>
   <p:notesSz cx="6858000" cy="9144000"/>
@@ -3556,6 +3559,102 @@
 </p:sld>
 </file>
 
+<file path=ppt/slides/slide21.xml><?xml version="1.0" encoding="utf-8"?>
+<p:sld xmlns:a="http://schemas.openxmlformats.org/drawingml/2006/main" xmlns:r="http://schemas.openxmlformats.org/officeDocument/2006/relationships" xmlns:p="http://schemas.openxmlformats.org/presentationml/2006/main">
+  <p:cSld>
+    <p:spTree>
+      <p:nvGrpSpPr>
+        <p:cNvPr id="1" name=""/>
+        <p:cNvGrpSpPr/>
+        <p:nvPr/>
+      </p:nvGrpSpPr>
+      <p:grpSpPr>
+        <a:xfrm>
+          <a:off x="0" y="0"/>
+          <a:ext cx="0" cy="0"/>
+          <a:chOff x="0" y="0"/>
+          <a:chExt cx="0" cy="0"/>
+        </a:xfrm>
+      </p:grpSpPr>
+    </p:spTree>
+  </p:cSld>
+  <p:clrMapOvr>
+    <a:masterClrMapping/>
+  </p:clrMapOvr>
+  <p:timing>
+    <p:tnLst>
+      <p:par>
+        <p:cTn id="1" dur="indefinite" restart="never" nodeType="tmRoot"/>
+      </p:par>
+    </p:tnLst>
+  </p:timing>
+</p:sld>
+</file>
+
+<file path=ppt/slides/slide22.xml><?xml version="1.0" encoding="utf-8"?>
+<p:sld xmlns:a="http://schemas.openxmlformats.org/drawingml/2006/main" xmlns:r="http://schemas.openxmlformats.org/officeDocument/2006/relationships" xmlns:p="http://schemas.openxmlformats.org/presentationml/2006/main">
+  <p:cSld>
+    <p:spTree>
+      <p:nvGrpSpPr>
+        <p:cNvPr id="1" name=""/>
+        <p:cNvGrpSpPr/>
+        <p:nvPr/>
+      </p:nvGrpSpPr>
+      <p:grpSpPr>
+        <a:xfrm>
+          <a:off x="0" y="0"/>
+          <a:ext cx="0" cy="0"/>
+          <a:chOff x="0" y="0"/>
+          <a:chExt cx="0" cy="0"/>
+        </a:xfrm>
+      </p:grpSpPr>
+    </p:spTree>
+  </p:cSld>
+  <p:clrMapOvr>
+    <a:masterClrMapping/>
+  </p:clrMapOvr>
+  <p:timing>
+    <p:tnLst>
+      <p:par>
+        <p:cTn id="1" dur="indefinite" restart="never" nodeType="tmRoot"/>
+      </p:par>
+    </p:tnLst>
+  </p:timing>
+</p:sld>
+</file>
+
+<file path=ppt/slides/slide23.xml><?xml version="1.0" encoding="utf-8"?>
+<p:sld xmlns:a="http://schemas.openxmlformats.org/drawingml/2006/main" xmlns:r="http://schemas.openxmlformats.org/officeDocument/2006/relationships" xmlns:p="http://schemas.openxmlformats.org/presentationml/2006/main">
+  <p:cSld>
+    <p:spTree>
+      <p:nvGrpSpPr>
+        <p:cNvPr id="1" name=""/>
+        <p:cNvGrpSpPr/>
+        <p:nvPr/>
+      </p:nvGrpSpPr>
+      <p:grpSpPr>
+        <a:xfrm>
+          <a:off x="0" y="0"/>
+          <a:ext cx="0" cy="0"/>
+          <a:chOff x="0" y="0"/>
+          <a:chExt cx="0" cy="0"/>
+        </a:xfrm>
+      </p:grpSpPr>
+    </p:spTree>
+  </p:cSld>
+  <p:clrMapOvr>
+    <a:masterClrMapping/>
+  </p:clrMapOvr>
+  <p:timing>
+    <p:tnLst>
+      <p:par>
+        <p:cTn id="1" dur="indefinite" restart="never" nodeType="tmRoot"/>
+      </p:par>
+    </p:tnLst>
+  </p:timing>
+</p:sld>
+</file>
+
 <file path=ppt/slides/slide3.xml><?xml version="1.0" encoding="utf-8"?>
 <p:sld xmlns:a="http://schemas.openxmlformats.org/drawingml/2006/main" xmlns:r="http://schemas.openxmlformats.org/officeDocument/2006/relationships" xmlns:p="http://schemas.openxmlformats.org/presentationml/2006/main">
   <p:cSld>

</xml_diff>

<commit_message>
Mouse Leia, couple, and relephant
</commit_message>
<xml_diff>
--- a/sketchbook.pptx
+++ b/sketchbook.pptx
@@ -28,6 +28,9 @@
     <p:sldId id="276" r:id="rId22"/>
     <p:sldId id="277" r:id="rId23"/>
     <p:sldId id="278" r:id="rId24"/>
+    <p:sldId id="279" r:id="rId25"/>
+    <p:sldId id="280" r:id="rId26"/>
+    <p:sldId id="281" r:id="rId27"/>
   </p:sldIdLst>
   <p:sldSz cx="9144000" cy="6858000" type="screen4x3"/>
   <p:notesSz cx="6858000" cy="9144000"/>
@@ -3655,6 +3658,102 @@
 </p:sld>
 </file>
 
+<file path=ppt/slides/slide24.xml><?xml version="1.0" encoding="utf-8"?>
+<p:sld xmlns:a="http://schemas.openxmlformats.org/drawingml/2006/main" xmlns:r="http://schemas.openxmlformats.org/officeDocument/2006/relationships" xmlns:p="http://schemas.openxmlformats.org/presentationml/2006/main">
+  <p:cSld>
+    <p:spTree>
+      <p:nvGrpSpPr>
+        <p:cNvPr id="1" name=""/>
+        <p:cNvGrpSpPr/>
+        <p:nvPr/>
+      </p:nvGrpSpPr>
+      <p:grpSpPr>
+        <a:xfrm>
+          <a:off x="0" y="0"/>
+          <a:ext cx="0" cy="0"/>
+          <a:chOff x="0" y="0"/>
+          <a:chExt cx="0" cy="0"/>
+        </a:xfrm>
+      </p:grpSpPr>
+    </p:spTree>
+  </p:cSld>
+  <p:clrMapOvr>
+    <a:masterClrMapping/>
+  </p:clrMapOvr>
+  <p:timing>
+    <p:tnLst>
+      <p:par>
+        <p:cTn id="1" dur="indefinite" restart="never" nodeType="tmRoot"/>
+      </p:par>
+    </p:tnLst>
+  </p:timing>
+</p:sld>
+</file>
+
+<file path=ppt/slides/slide25.xml><?xml version="1.0" encoding="utf-8"?>
+<p:sld xmlns:a="http://schemas.openxmlformats.org/drawingml/2006/main" xmlns:r="http://schemas.openxmlformats.org/officeDocument/2006/relationships" xmlns:p="http://schemas.openxmlformats.org/presentationml/2006/main">
+  <p:cSld>
+    <p:spTree>
+      <p:nvGrpSpPr>
+        <p:cNvPr id="1" name=""/>
+        <p:cNvGrpSpPr/>
+        <p:nvPr/>
+      </p:nvGrpSpPr>
+      <p:grpSpPr>
+        <a:xfrm>
+          <a:off x="0" y="0"/>
+          <a:ext cx="0" cy="0"/>
+          <a:chOff x="0" y="0"/>
+          <a:chExt cx="0" cy="0"/>
+        </a:xfrm>
+      </p:grpSpPr>
+    </p:spTree>
+  </p:cSld>
+  <p:clrMapOvr>
+    <a:masterClrMapping/>
+  </p:clrMapOvr>
+  <p:timing>
+    <p:tnLst>
+      <p:par>
+        <p:cTn id="1" dur="indefinite" restart="never" nodeType="tmRoot"/>
+      </p:par>
+    </p:tnLst>
+  </p:timing>
+</p:sld>
+</file>
+
+<file path=ppt/slides/slide26.xml><?xml version="1.0" encoding="utf-8"?>
+<p:sld xmlns:a="http://schemas.openxmlformats.org/drawingml/2006/main" xmlns:r="http://schemas.openxmlformats.org/officeDocument/2006/relationships" xmlns:p="http://schemas.openxmlformats.org/presentationml/2006/main">
+  <p:cSld>
+    <p:spTree>
+      <p:nvGrpSpPr>
+        <p:cNvPr id="1" name=""/>
+        <p:cNvGrpSpPr/>
+        <p:nvPr/>
+      </p:nvGrpSpPr>
+      <p:grpSpPr>
+        <a:xfrm>
+          <a:off x="0" y="0"/>
+          <a:ext cx="0" cy="0"/>
+          <a:chOff x="0" y="0"/>
+          <a:chExt cx="0" cy="0"/>
+        </a:xfrm>
+      </p:grpSpPr>
+    </p:spTree>
+  </p:cSld>
+  <p:clrMapOvr>
+    <a:masterClrMapping/>
+  </p:clrMapOvr>
+  <p:timing>
+    <p:tnLst>
+      <p:par>
+        <p:cTn id="1" dur="indefinite" restart="never" nodeType="tmRoot"/>
+      </p:par>
+    </p:tnLst>
+  </p:timing>
+</p:sld>
+</file>
+
 <file path=ppt/slides/slide3.xml><?xml version="1.0" encoding="utf-8"?>
 <p:sld xmlns:a="http://schemas.openxmlformats.org/drawingml/2006/main" xmlns:r="http://schemas.openxmlformats.org/officeDocument/2006/relationships" xmlns:p="http://schemas.openxmlformats.org/presentationml/2006/main">
   <p:cSld>

</xml_diff>

<commit_message>
Programming spartan, hungry washing machine
</commit_message>
<xml_diff>
--- a/sketchbook.pptx
+++ b/sketchbook.pptx
@@ -31,6 +31,8 @@
     <p:sldId id="279" r:id="rId25"/>
     <p:sldId id="280" r:id="rId26"/>
     <p:sldId id="281" r:id="rId27"/>
+    <p:sldId id="282" r:id="rId28"/>
+    <p:sldId id="283" r:id="rId29"/>
   </p:sldIdLst>
   <p:sldSz cx="9144000" cy="6858000" type="screen4x3"/>
   <p:notesSz cx="6858000" cy="9144000"/>
@@ -314,7 +316,7 @@
             <a:fld id="{54D51C8F-29A5-40B1-B56C-20C15425DA5B}" type="datetimeFigureOut">
               <a:rPr lang="en-CA" smtClean="0"/>
               <a:pPr/>
-              <a:t>2014-01-12</a:t>
+              <a:t>2014-01-17</a:t>
             </a:fld>
             <a:endParaRPr lang="en-CA"/>
           </a:p>
@@ -481,7 +483,7 @@
             <a:fld id="{54D51C8F-29A5-40B1-B56C-20C15425DA5B}" type="datetimeFigureOut">
               <a:rPr lang="en-CA" smtClean="0"/>
               <a:pPr/>
-              <a:t>2014-01-12</a:t>
+              <a:t>2014-01-17</a:t>
             </a:fld>
             <a:endParaRPr lang="en-CA"/>
           </a:p>
@@ -658,7 +660,7 @@
             <a:fld id="{54D51C8F-29A5-40B1-B56C-20C15425DA5B}" type="datetimeFigureOut">
               <a:rPr lang="en-CA" smtClean="0"/>
               <a:pPr/>
-              <a:t>2014-01-12</a:t>
+              <a:t>2014-01-17</a:t>
             </a:fld>
             <a:endParaRPr lang="en-CA"/>
           </a:p>
@@ -825,7 +827,7 @@
             <a:fld id="{54D51C8F-29A5-40B1-B56C-20C15425DA5B}" type="datetimeFigureOut">
               <a:rPr lang="en-CA" smtClean="0"/>
               <a:pPr/>
-              <a:t>2014-01-12</a:t>
+              <a:t>2014-01-17</a:t>
             </a:fld>
             <a:endParaRPr lang="en-CA"/>
           </a:p>
@@ -1068,7 +1070,7 @@
             <a:fld id="{54D51C8F-29A5-40B1-B56C-20C15425DA5B}" type="datetimeFigureOut">
               <a:rPr lang="en-CA" smtClean="0"/>
               <a:pPr/>
-              <a:t>2014-01-12</a:t>
+              <a:t>2014-01-17</a:t>
             </a:fld>
             <a:endParaRPr lang="en-CA"/>
           </a:p>
@@ -1353,7 +1355,7 @@
             <a:fld id="{54D51C8F-29A5-40B1-B56C-20C15425DA5B}" type="datetimeFigureOut">
               <a:rPr lang="en-CA" smtClean="0"/>
               <a:pPr/>
-              <a:t>2014-01-12</a:t>
+              <a:t>2014-01-17</a:t>
             </a:fld>
             <a:endParaRPr lang="en-CA"/>
           </a:p>
@@ -1772,7 +1774,7 @@
             <a:fld id="{54D51C8F-29A5-40B1-B56C-20C15425DA5B}" type="datetimeFigureOut">
               <a:rPr lang="en-CA" smtClean="0"/>
               <a:pPr/>
-              <a:t>2014-01-12</a:t>
+              <a:t>2014-01-17</a:t>
             </a:fld>
             <a:endParaRPr lang="en-CA"/>
           </a:p>
@@ -1887,7 +1889,7 @@
             <a:fld id="{54D51C8F-29A5-40B1-B56C-20C15425DA5B}" type="datetimeFigureOut">
               <a:rPr lang="en-CA" smtClean="0"/>
               <a:pPr/>
-              <a:t>2014-01-12</a:t>
+              <a:t>2014-01-17</a:t>
             </a:fld>
             <a:endParaRPr lang="en-CA"/>
           </a:p>
@@ -1979,7 +1981,7 @@
             <a:fld id="{54D51C8F-29A5-40B1-B56C-20C15425DA5B}" type="datetimeFigureOut">
               <a:rPr lang="en-CA" smtClean="0"/>
               <a:pPr/>
-              <a:t>2014-01-12</a:t>
+              <a:t>2014-01-17</a:t>
             </a:fld>
             <a:endParaRPr lang="en-CA"/>
           </a:p>
@@ -2253,7 +2255,7 @@
             <a:fld id="{54D51C8F-29A5-40B1-B56C-20C15425DA5B}" type="datetimeFigureOut">
               <a:rPr lang="en-CA" smtClean="0"/>
               <a:pPr/>
-              <a:t>2014-01-12</a:t>
+              <a:t>2014-01-17</a:t>
             </a:fld>
             <a:endParaRPr lang="en-CA"/>
           </a:p>
@@ -2503,7 +2505,7 @@
             <a:fld id="{54D51C8F-29A5-40B1-B56C-20C15425DA5B}" type="datetimeFigureOut">
               <a:rPr lang="en-CA" smtClean="0"/>
               <a:pPr/>
-              <a:t>2014-01-12</a:t>
+              <a:t>2014-01-17</a:t>
             </a:fld>
             <a:endParaRPr lang="en-CA"/>
           </a:p>
@@ -2713,7 +2715,7 @@
             <a:fld id="{54D51C8F-29A5-40B1-B56C-20C15425DA5B}" type="datetimeFigureOut">
               <a:rPr lang="en-CA" smtClean="0"/>
               <a:pPr/>
-              <a:t>2014-01-12</a:t>
+              <a:t>2014-01-17</a:t>
             </a:fld>
             <a:endParaRPr lang="en-CA"/>
           </a:p>
@@ -3754,6 +3756,70 @@
 </p:sld>
 </file>
 
+<file path=ppt/slides/slide27.xml><?xml version="1.0" encoding="utf-8"?>
+<p:sld xmlns:a="http://schemas.openxmlformats.org/drawingml/2006/main" xmlns:r="http://schemas.openxmlformats.org/officeDocument/2006/relationships" xmlns:p="http://schemas.openxmlformats.org/presentationml/2006/main">
+  <p:cSld>
+    <p:spTree>
+      <p:nvGrpSpPr>
+        <p:cNvPr id="1" name=""/>
+        <p:cNvGrpSpPr/>
+        <p:nvPr/>
+      </p:nvGrpSpPr>
+      <p:grpSpPr>
+        <a:xfrm>
+          <a:off x="0" y="0"/>
+          <a:ext cx="0" cy="0"/>
+          <a:chOff x="0" y="0"/>
+          <a:chExt cx="0" cy="0"/>
+        </a:xfrm>
+      </p:grpSpPr>
+    </p:spTree>
+  </p:cSld>
+  <p:clrMapOvr>
+    <a:masterClrMapping/>
+  </p:clrMapOvr>
+  <p:timing>
+    <p:tnLst>
+      <p:par>
+        <p:cTn id="1" dur="indefinite" restart="never" nodeType="tmRoot"/>
+      </p:par>
+    </p:tnLst>
+  </p:timing>
+</p:sld>
+</file>
+
+<file path=ppt/slides/slide28.xml><?xml version="1.0" encoding="utf-8"?>
+<p:sld xmlns:a="http://schemas.openxmlformats.org/drawingml/2006/main" xmlns:r="http://schemas.openxmlformats.org/officeDocument/2006/relationships" xmlns:p="http://schemas.openxmlformats.org/presentationml/2006/main">
+  <p:cSld>
+    <p:spTree>
+      <p:nvGrpSpPr>
+        <p:cNvPr id="1" name=""/>
+        <p:cNvGrpSpPr/>
+        <p:nvPr/>
+      </p:nvGrpSpPr>
+      <p:grpSpPr>
+        <a:xfrm>
+          <a:off x="0" y="0"/>
+          <a:ext cx="0" cy="0"/>
+          <a:chOff x="0" y="0"/>
+          <a:chExt cx="0" cy="0"/>
+        </a:xfrm>
+      </p:grpSpPr>
+    </p:spTree>
+  </p:cSld>
+  <p:clrMapOvr>
+    <a:masterClrMapping/>
+  </p:clrMapOvr>
+  <p:timing>
+    <p:tnLst>
+      <p:par>
+        <p:cTn id="1" dur="indefinite" restart="never" nodeType="tmRoot"/>
+      </p:par>
+    </p:tnLst>
+  </p:timing>
+</p:sld>
+</file>
+
 <file path=ppt/slides/slide3.xml><?xml version="1.0" encoding="utf-8"?>
 <p:sld xmlns:a="http://schemas.openxmlformats.org/drawingml/2006/main" xmlns:r="http://schemas.openxmlformats.org/officeDocument/2006/relationships" xmlns:p="http://schemas.openxmlformats.org/presentationml/2006/main">
   <p:cSld>

</xml_diff>

<commit_message>
Overly environmentally friendly Clarion
</commit_message>
<xml_diff>
--- a/sketchbook.pptx
+++ b/sketchbook.pptx
@@ -33,6 +33,7 @@
     <p:sldId id="281" r:id="rId27"/>
     <p:sldId id="282" r:id="rId28"/>
     <p:sldId id="283" r:id="rId29"/>
+    <p:sldId id="284" r:id="rId30"/>
   </p:sldIdLst>
   <p:sldSz cx="9144000" cy="6858000" type="screen4x3"/>
   <p:notesSz cx="6858000" cy="9144000"/>
@@ -316,7 +317,7 @@
             <a:fld id="{54D51C8F-29A5-40B1-B56C-20C15425DA5B}" type="datetimeFigureOut">
               <a:rPr lang="en-CA" smtClean="0"/>
               <a:pPr/>
-              <a:t>2014-01-17</a:t>
+              <a:t>2014-01-21</a:t>
             </a:fld>
             <a:endParaRPr lang="en-CA"/>
           </a:p>
@@ -483,7 +484,7 @@
             <a:fld id="{54D51C8F-29A5-40B1-B56C-20C15425DA5B}" type="datetimeFigureOut">
               <a:rPr lang="en-CA" smtClean="0"/>
               <a:pPr/>
-              <a:t>2014-01-17</a:t>
+              <a:t>2014-01-21</a:t>
             </a:fld>
             <a:endParaRPr lang="en-CA"/>
           </a:p>
@@ -660,7 +661,7 @@
             <a:fld id="{54D51C8F-29A5-40B1-B56C-20C15425DA5B}" type="datetimeFigureOut">
               <a:rPr lang="en-CA" smtClean="0"/>
               <a:pPr/>
-              <a:t>2014-01-17</a:t>
+              <a:t>2014-01-21</a:t>
             </a:fld>
             <a:endParaRPr lang="en-CA"/>
           </a:p>
@@ -827,7 +828,7 @@
             <a:fld id="{54D51C8F-29A5-40B1-B56C-20C15425DA5B}" type="datetimeFigureOut">
               <a:rPr lang="en-CA" smtClean="0"/>
               <a:pPr/>
-              <a:t>2014-01-17</a:t>
+              <a:t>2014-01-21</a:t>
             </a:fld>
             <a:endParaRPr lang="en-CA"/>
           </a:p>
@@ -1070,7 +1071,7 @@
             <a:fld id="{54D51C8F-29A5-40B1-B56C-20C15425DA5B}" type="datetimeFigureOut">
               <a:rPr lang="en-CA" smtClean="0"/>
               <a:pPr/>
-              <a:t>2014-01-17</a:t>
+              <a:t>2014-01-21</a:t>
             </a:fld>
             <a:endParaRPr lang="en-CA"/>
           </a:p>
@@ -1355,7 +1356,7 @@
             <a:fld id="{54D51C8F-29A5-40B1-B56C-20C15425DA5B}" type="datetimeFigureOut">
               <a:rPr lang="en-CA" smtClean="0"/>
               <a:pPr/>
-              <a:t>2014-01-17</a:t>
+              <a:t>2014-01-21</a:t>
             </a:fld>
             <a:endParaRPr lang="en-CA"/>
           </a:p>
@@ -1774,7 +1775,7 @@
             <a:fld id="{54D51C8F-29A5-40B1-B56C-20C15425DA5B}" type="datetimeFigureOut">
               <a:rPr lang="en-CA" smtClean="0"/>
               <a:pPr/>
-              <a:t>2014-01-17</a:t>
+              <a:t>2014-01-21</a:t>
             </a:fld>
             <a:endParaRPr lang="en-CA"/>
           </a:p>
@@ -1889,7 +1890,7 @@
             <a:fld id="{54D51C8F-29A5-40B1-B56C-20C15425DA5B}" type="datetimeFigureOut">
               <a:rPr lang="en-CA" smtClean="0"/>
               <a:pPr/>
-              <a:t>2014-01-17</a:t>
+              <a:t>2014-01-21</a:t>
             </a:fld>
             <a:endParaRPr lang="en-CA"/>
           </a:p>
@@ -1981,7 +1982,7 @@
             <a:fld id="{54D51C8F-29A5-40B1-B56C-20C15425DA5B}" type="datetimeFigureOut">
               <a:rPr lang="en-CA" smtClean="0"/>
               <a:pPr/>
-              <a:t>2014-01-17</a:t>
+              <a:t>2014-01-21</a:t>
             </a:fld>
             <a:endParaRPr lang="en-CA"/>
           </a:p>
@@ -2255,7 +2256,7 @@
             <a:fld id="{54D51C8F-29A5-40B1-B56C-20C15425DA5B}" type="datetimeFigureOut">
               <a:rPr lang="en-CA" smtClean="0"/>
               <a:pPr/>
-              <a:t>2014-01-17</a:t>
+              <a:t>2014-01-21</a:t>
             </a:fld>
             <a:endParaRPr lang="en-CA"/>
           </a:p>
@@ -2505,7 +2506,7 @@
             <a:fld id="{54D51C8F-29A5-40B1-B56C-20C15425DA5B}" type="datetimeFigureOut">
               <a:rPr lang="en-CA" smtClean="0"/>
               <a:pPr/>
-              <a:t>2014-01-17</a:t>
+              <a:t>2014-01-21</a:t>
             </a:fld>
             <a:endParaRPr lang="en-CA"/>
           </a:p>
@@ -2715,7 +2716,7 @@
             <a:fld id="{54D51C8F-29A5-40B1-B56C-20C15425DA5B}" type="datetimeFigureOut">
               <a:rPr lang="en-CA" smtClean="0"/>
               <a:pPr/>
-              <a:t>2014-01-17</a:t>
+              <a:t>2014-01-21</a:t>
             </a:fld>
             <a:endParaRPr lang="en-CA"/>
           </a:p>
@@ -3820,6 +3821,38 @@
 </p:sld>
 </file>
 
+<file path=ppt/slides/slide29.xml><?xml version="1.0" encoding="utf-8"?>
+<p:sld xmlns:a="http://schemas.openxmlformats.org/drawingml/2006/main" xmlns:r="http://schemas.openxmlformats.org/officeDocument/2006/relationships" xmlns:p="http://schemas.openxmlformats.org/presentationml/2006/main">
+  <p:cSld>
+    <p:spTree>
+      <p:nvGrpSpPr>
+        <p:cNvPr id="1" name=""/>
+        <p:cNvGrpSpPr/>
+        <p:nvPr/>
+      </p:nvGrpSpPr>
+      <p:grpSpPr>
+        <a:xfrm>
+          <a:off x="0" y="0"/>
+          <a:ext cx="0" cy="0"/>
+          <a:chOff x="0" y="0"/>
+          <a:chExt cx="0" cy="0"/>
+        </a:xfrm>
+      </p:grpSpPr>
+    </p:spTree>
+  </p:cSld>
+  <p:clrMapOvr>
+    <a:masterClrMapping/>
+  </p:clrMapOvr>
+  <p:timing>
+    <p:tnLst>
+      <p:par>
+        <p:cTn id="1" dur="indefinite" restart="never" nodeType="tmRoot"/>
+      </p:par>
+    </p:tnLst>
+  </p:timing>
+</p:sld>
+</file>
+
 <file path=ppt/slides/slide3.xml><?xml version="1.0" encoding="utf-8"?>
 <p:sld xmlns:a="http://schemas.openxmlformats.org/drawingml/2006/main" xmlns:r="http://schemas.openxmlformats.org/officeDocument/2006/relationships" xmlns:p="http://schemas.openxmlformats.org/presentationml/2006/main">
   <p:cSld>

</xml_diff>

<commit_message>
Debate, Waterfall 1, Waterfall 2
</commit_message>
<xml_diff>
--- a/sketchbook.pptx
+++ b/sketchbook.pptx
@@ -35,6 +35,9 @@
     <p:sldId id="283" r:id="rId29"/>
     <p:sldId id="284" r:id="rId30"/>
     <p:sldId id="285" r:id="rId31"/>
+    <p:sldId id="286" r:id="rId32"/>
+    <p:sldId id="287" r:id="rId33"/>
+    <p:sldId id="288" r:id="rId34"/>
   </p:sldIdLst>
   <p:sldSz cx="9144000" cy="6858000" type="screen4x3"/>
   <p:notesSz cx="6858000" cy="9144000"/>
@@ -318,7 +321,7 @@
             <a:fld id="{54D51C8F-29A5-40B1-B56C-20C15425DA5B}" type="datetimeFigureOut">
               <a:rPr lang="en-CA" smtClean="0"/>
               <a:pPr/>
-              <a:t>2014-01-22</a:t>
+              <a:t>2014-01-26</a:t>
             </a:fld>
             <a:endParaRPr lang="en-CA"/>
           </a:p>
@@ -485,7 +488,7 @@
             <a:fld id="{54D51C8F-29A5-40B1-B56C-20C15425DA5B}" type="datetimeFigureOut">
               <a:rPr lang="en-CA" smtClean="0"/>
               <a:pPr/>
-              <a:t>2014-01-22</a:t>
+              <a:t>2014-01-26</a:t>
             </a:fld>
             <a:endParaRPr lang="en-CA"/>
           </a:p>
@@ -662,7 +665,7 @@
             <a:fld id="{54D51C8F-29A5-40B1-B56C-20C15425DA5B}" type="datetimeFigureOut">
               <a:rPr lang="en-CA" smtClean="0"/>
               <a:pPr/>
-              <a:t>2014-01-22</a:t>
+              <a:t>2014-01-26</a:t>
             </a:fld>
             <a:endParaRPr lang="en-CA"/>
           </a:p>
@@ -829,7 +832,7 @@
             <a:fld id="{54D51C8F-29A5-40B1-B56C-20C15425DA5B}" type="datetimeFigureOut">
               <a:rPr lang="en-CA" smtClean="0"/>
               <a:pPr/>
-              <a:t>2014-01-22</a:t>
+              <a:t>2014-01-26</a:t>
             </a:fld>
             <a:endParaRPr lang="en-CA"/>
           </a:p>
@@ -1072,7 +1075,7 @@
             <a:fld id="{54D51C8F-29A5-40B1-B56C-20C15425DA5B}" type="datetimeFigureOut">
               <a:rPr lang="en-CA" smtClean="0"/>
               <a:pPr/>
-              <a:t>2014-01-22</a:t>
+              <a:t>2014-01-26</a:t>
             </a:fld>
             <a:endParaRPr lang="en-CA"/>
           </a:p>
@@ -1357,7 +1360,7 @@
             <a:fld id="{54D51C8F-29A5-40B1-B56C-20C15425DA5B}" type="datetimeFigureOut">
               <a:rPr lang="en-CA" smtClean="0"/>
               <a:pPr/>
-              <a:t>2014-01-22</a:t>
+              <a:t>2014-01-26</a:t>
             </a:fld>
             <a:endParaRPr lang="en-CA"/>
           </a:p>
@@ -1776,7 +1779,7 @@
             <a:fld id="{54D51C8F-29A5-40B1-B56C-20C15425DA5B}" type="datetimeFigureOut">
               <a:rPr lang="en-CA" smtClean="0"/>
               <a:pPr/>
-              <a:t>2014-01-22</a:t>
+              <a:t>2014-01-26</a:t>
             </a:fld>
             <a:endParaRPr lang="en-CA"/>
           </a:p>
@@ -1891,7 +1894,7 @@
             <a:fld id="{54D51C8F-29A5-40B1-B56C-20C15425DA5B}" type="datetimeFigureOut">
               <a:rPr lang="en-CA" smtClean="0"/>
               <a:pPr/>
-              <a:t>2014-01-22</a:t>
+              <a:t>2014-01-26</a:t>
             </a:fld>
             <a:endParaRPr lang="en-CA"/>
           </a:p>
@@ -1983,7 +1986,7 @@
             <a:fld id="{54D51C8F-29A5-40B1-B56C-20C15425DA5B}" type="datetimeFigureOut">
               <a:rPr lang="en-CA" smtClean="0"/>
               <a:pPr/>
-              <a:t>2014-01-22</a:t>
+              <a:t>2014-01-26</a:t>
             </a:fld>
             <a:endParaRPr lang="en-CA"/>
           </a:p>
@@ -2257,7 +2260,7 @@
             <a:fld id="{54D51C8F-29A5-40B1-B56C-20C15425DA5B}" type="datetimeFigureOut">
               <a:rPr lang="en-CA" smtClean="0"/>
               <a:pPr/>
-              <a:t>2014-01-22</a:t>
+              <a:t>2014-01-26</a:t>
             </a:fld>
             <a:endParaRPr lang="en-CA"/>
           </a:p>
@@ -2507,7 +2510,7 @@
             <a:fld id="{54D51C8F-29A5-40B1-B56C-20C15425DA5B}" type="datetimeFigureOut">
               <a:rPr lang="en-CA" smtClean="0"/>
               <a:pPr/>
-              <a:t>2014-01-22</a:t>
+              <a:t>2014-01-26</a:t>
             </a:fld>
             <a:endParaRPr lang="en-CA"/>
           </a:p>
@@ -2717,7 +2720,7 @@
             <a:fld id="{54D51C8F-29A5-40B1-B56C-20C15425DA5B}" type="datetimeFigureOut">
               <a:rPr lang="en-CA" smtClean="0"/>
               <a:pPr/>
-              <a:t>2014-01-22</a:t>
+              <a:t>2014-01-26</a:t>
             </a:fld>
             <a:endParaRPr lang="en-CA"/>
           </a:p>
@@ -3887,6 +3890,102 @@
 </file>
 
 <file path=ppt/slides/slide30.xml><?xml version="1.0" encoding="utf-8"?>
+<p:sld xmlns:a="http://schemas.openxmlformats.org/drawingml/2006/main" xmlns:r="http://schemas.openxmlformats.org/officeDocument/2006/relationships" xmlns:p="http://schemas.openxmlformats.org/presentationml/2006/main">
+  <p:cSld>
+    <p:spTree>
+      <p:nvGrpSpPr>
+        <p:cNvPr id="1" name=""/>
+        <p:cNvGrpSpPr/>
+        <p:nvPr/>
+      </p:nvGrpSpPr>
+      <p:grpSpPr>
+        <a:xfrm>
+          <a:off x="0" y="0"/>
+          <a:ext cx="0" cy="0"/>
+          <a:chOff x="0" y="0"/>
+          <a:chExt cx="0" cy="0"/>
+        </a:xfrm>
+      </p:grpSpPr>
+    </p:spTree>
+  </p:cSld>
+  <p:clrMapOvr>
+    <a:masterClrMapping/>
+  </p:clrMapOvr>
+  <p:timing>
+    <p:tnLst>
+      <p:par>
+        <p:cTn id="1" dur="indefinite" restart="never" nodeType="tmRoot"/>
+      </p:par>
+    </p:tnLst>
+  </p:timing>
+</p:sld>
+</file>
+
+<file path=ppt/slides/slide31.xml><?xml version="1.0" encoding="utf-8"?>
+<p:sld xmlns:a="http://schemas.openxmlformats.org/drawingml/2006/main" xmlns:r="http://schemas.openxmlformats.org/officeDocument/2006/relationships" xmlns:p="http://schemas.openxmlformats.org/presentationml/2006/main">
+  <p:cSld>
+    <p:spTree>
+      <p:nvGrpSpPr>
+        <p:cNvPr id="1" name=""/>
+        <p:cNvGrpSpPr/>
+        <p:nvPr/>
+      </p:nvGrpSpPr>
+      <p:grpSpPr>
+        <a:xfrm>
+          <a:off x="0" y="0"/>
+          <a:ext cx="0" cy="0"/>
+          <a:chOff x="0" y="0"/>
+          <a:chExt cx="0" cy="0"/>
+        </a:xfrm>
+      </p:grpSpPr>
+    </p:spTree>
+  </p:cSld>
+  <p:clrMapOvr>
+    <a:masterClrMapping/>
+  </p:clrMapOvr>
+  <p:timing>
+    <p:tnLst>
+      <p:par>
+        <p:cTn id="1" dur="indefinite" restart="never" nodeType="tmRoot"/>
+      </p:par>
+    </p:tnLst>
+  </p:timing>
+</p:sld>
+</file>
+
+<file path=ppt/slides/slide32.xml><?xml version="1.0" encoding="utf-8"?>
+<p:sld xmlns:a="http://schemas.openxmlformats.org/drawingml/2006/main" xmlns:r="http://schemas.openxmlformats.org/officeDocument/2006/relationships" xmlns:p="http://schemas.openxmlformats.org/presentationml/2006/main">
+  <p:cSld>
+    <p:spTree>
+      <p:nvGrpSpPr>
+        <p:cNvPr id="1" name=""/>
+        <p:cNvGrpSpPr/>
+        <p:nvPr/>
+      </p:nvGrpSpPr>
+      <p:grpSpPr>
+        <a:xfrm>
+          <a:off x="0" y="0"/>
+          <a:ext cx="0" cy="0"/>
+          <a:chOff x="0" y="0"/>
+          <a:chExt cx="0" cy="0"/>
+        </a:xfrm>
+      </p:grpSpPr>
+    </p:spTree>
+  </p:cSld>
+  <p:clrMapOvr>
+    <a:masterClrMapping/>
+  </p:clrMapOvr>
+  <p:timing>
+    <p:tnLst>
+      <p:par>
+        <p:cTn id="1" dur="indefinite" restart="never" nodeType="tmRoot"/>
+      </p:par>
+    </p:tnLst>
+  </p:timing>
+</p:sld>
+</file>
+
+<file path=ppt/slides/slide33.xml><?xml version="1.0" encoding="utf-8"?>
 <p:sld xmlns:a="http://schemas.openxmlformats.org/drawingml/2006/main" xmlns:r="http://schemas.openxmlformats.org/officeDocument/2006/relationships" xmlns:p="http://schemas.openxmlformats.org/presentationml/2006/main">
   <p:cSld>
     <p:spTree>

</xml_diff>

<commit_message>
Mad axeperson, Flip the Table, fail drawing of Ismyrn/Luzcrezo from Aspects
</commit_message>
<xml_diff>
--- a/sketchbook.pptx
+++ b/sketchbook.pptx
@@ -38,6 +38,13 @@
     <p:sldId id="286" r:id="rId32"/>
     <p:sldId id="287" r:id="rId33"/>
     <p:sldId id="288" r:id="rId34"/>
+    <p:sldId id="289" r:id="rId35"/>
+    <p:sldId id="290" r:id="rId36"/>
+    <p:sldId id="291" r:id="rId37"/>
+    <p:sldId id="292" r:id="rId38"/>
+    <p:sldId id="293" r:id="rId39"/>
+    <p:sldId id="294" r:id="rId40"/>
+    <p:sldId id="295" r:id="rId41"/>
   </p:sldIdLst>
   <p:sldSz cx="9144000" cy="6858000" type="screen4x3"/>
   <p:notesSz cx="6858000" cy="9144000"/>
@@ -321,7 +328,7 @@
             <a:fld id="{54D51C8F-29A5-40B1-B56C-20C15425DA5B}" type="datetimeFigureOut">
               <a:rPr lang="en-CA" smtClean="0"/>
               <a:pPr/>
-              <a:t>2014-01-26</a:t>
+              <a:t>2014-02-07</a:t>
             </a:fld>
             <a:endParaRPr lang="en-CA"/>
           </a:p>
@@ -488,7 +495,7 @@
             <a:fld id="{54D51C8F-29A5-40B1-B56C-20C15425DA5B}" type="datetimeFigureOut">
               <a:rPr lang="en-CA" smtClean="0"/>
               <a:pPr/>
-              <a:t>2014-01-26</a:t>
+              <a:t>2014-02-07</a:t>
             </a:fld>
             <a:endParaRPr lang="en-CA"/>
           </a:p>
@@ -665,7 +672,7 @@
             <a:fld id="{54D51C8F-29A5-40B1-B56C-20C15425DA5B}" type="datetimeFigureOut">
               <a:rPr lang="en-CA" smtClean="0"/>
               <a:pPr/>
-              <a:t>2014-01-26</a:t>
+              <a:t>2014-02-07</a:t>
             </a:fld>
             <a:endParaRPr lang="en-CA"/>
           </a:p>
@@ -832,7 +839,7 @@
             <a:fld id="{54D51C8F-29A5-40B1-B56C-20C15425DA5B}" type="datetimeFigureOut">
               <a:rPr lang="en-CA" smtClean="0"/>
               <a:pPr/>
-              <a:t>2014-01-26</a:t>
+              <a:t>2014-02-07</a:t>
             </a:fld>
             <a:endParaRPr lang="en-CA"/>
           </a:p>
@@ -1075,7 +1082,7 @@
             <a:fld id="{54D51C8F-29A5-40B1-B56C-20C15425DA5B}" type="datetimeFigureOut">
               <a:rPr lang="en-CA" smtClean="0"/>
               <a:pPr/>
-              <a:t>2014-01-26</a:t>
+              <a:t>2014-02-07</a:t>
             </a:fld>
             <a:endParaRPr lang="en-CA"/>
           </a:p>
@@ -1360,7 +1367,7 @@
             <a:fld id="{54D51C8F-29A5-40B1-B56C-20C15425DA5B}" type="datetimeFigureOut">
               <a:rPr lang="en-CA" smtClean="0"/>
               <a:pPr/>
-              <a:t>2014-01-26</a:t>
+              <a:t>2014-02-07</a:t>
             </a:fld>
             <a:endParaRPr lang="en-CA"/>
           </a:p>
@@ -1779,7 +1786,7 @@
             <a:fld id="{54D51C8F-29A5-40B1-B56C-20C15425DA5B}" type="datetimeFigureOut">
               <a:rPr lang="en-CA" smtClean="0"/>
               <a:pPr/>
-              <a:t>2014-01-26</a:t>
+              <a:t>2014-02-07</a:t>
             </a:fld>
             <a:endParaRPr lang="en-CA"/>
           </a:p>
@@ -1894,7 +1901,7 @@
             <a:fld id="{54D51C8F-29A5-40B1-B56C-20C15425DA5B}" type="datetimeFigureOut">
               <a:rPr lang="en-CA" smtClean="0"/>
               <a:pPr/>
-              <a:t>2014-01-26</a:t>
+              <a:t>2014-02-07</a:t>
             </a:fld>
             <a:endParaRPr lang="en-CA"/>
           </a:p>
@@ -1986,7 +1993,7 @@
             <a:fld id="{54D51C8F-29A5-40B1-B56C-20C15425DA5B}" type="datetimeFigureOut">
               <a:rPr lang="en-CA" smtClean="0"/>
               <a:pPr/>
-              <a:t>2014-01-26</a:t>
+              <a:t>2014-02-07</a:t>
             </a:fld>
             <a:endParaRPr lang="en-CA"/>
           </a:p>
@@ -2260,7 +2267,7 @@
             <a:fld id="{54D51C8F-29A5-40B1-B56C-20C15425DA5B}" type="datetimeFigureOut">
               <a:rPr lang="en-CA" smtClean="0"/>
               <a:pPr/>
-              <a:t>2014-01-26</a:t>
+              <a:t>2014-02-07</a:t>
             </a:fld>
             <a:endParaRPr lang="en-CA"/>
           </a:p>
@@ -2510,7 +2517,7 @@
             <a:fld id="{54D51C8F-29A5-40B1-B56C-20C15425DA5B}" type="datetimeFigureOut">
               <a:rPr lang="en-CA" smtClean="0"/>
               <a:pPr/>
-              <a:t>2014-01-26</a:t>
+              <a:t>2014-02-07</a:t>
             </a:fld>
             <a:endParaRPr lang="en-CA"/>
           </a:p>
@@ -2720,7 +2727,7 @@
             <a:fld id="{54D51C8F-29A5-40B1-B56C-20C15425DA5B}" type="datetimeFigureOut">
               <a:rPr lang="en-CA" smtClean="0"/>
               <a:pPr/>
-              <a:t>2014-01-26</a:t>
+              <a:t>2014-02-07</a:t>
             </a:fld>
             <a:endParaRPr lang="en-CA"/>
           </a:p>
@@ -4017,6 +4024,228 @@
 </p:sld>
 </file>
 
+<file path=ppt/slides/slide34.xml><?xml version="1.0" encoding="utf-8"?>
+<p:sld xmlns:a="http://schemas.openxmlformats.org/drawingml/2006/main" xmlns:r="http://schemas.openxmlformats.org/officeDocument/2006/relationships" xmlns:p="http://schemas.openxmlformats.org/presentationml/2006/main">
+  <p:cSld>
+    <p:spTree>
+      <p:nvGrpSpPr>
+        <p:cNvPr id="1" name=""/>
+        <p:cNvGrpSpPr/>
+        <p:nvPr/>
+      </p:nvGrpSpPr>
+      <p:grpSpPr>
+        <a:xfrm>
+          <a:off x="0" y="0"/>
+          <a:ext cx="0" cy="0"/>
+          <a:chOff x="0" y="0"/>
+          <a:chExt cx="0" cy="0"/>
+        </a:xfrm>
+      </p:grpSpPr>
+    </p:spTree>
+  </p:cSld>
+  <p:clrMapOvr>
+    <a:masterClrMapping/>
+  </p:clrMapOvr>
+  <p:timing>
+    <p:tnLst>
+      <p:par>
+        <p:cTn id="1" dur="indefinite" restart="never" nodeType="tmRoot"/>
+      </p:par>
+    </p:tnLst>
+  </p:timing>
+</p:sld>
+</file>
+
+<file path=ppt/slides/slide35.xml><?xml version="1.0" encoding="utf-8"?>
+<p:sld xmlns:a="http://schemas.openxmlformats.org/drawingml/2006/main" xmlns:r="http://schemas.openxmlformats.org/officeDocument/2006/relationships" xmlns:p="http://schemas.openxmlformats.org/presentationml/2006/main">
+  <p:cSld>
+    <p:spTree>
+      <p:nvGrpSpPr>
+        <p:cNvPr id="1" name=""/>
+        <p:cNvGrpSpPr/>
+        <p:nvPr/>
+      </p:nvGrpSpPr>
+      <p:grpSpPr>
+        <a:xfrm>
+          <a:off x="0" y="0"/>
+          <a:ext cx="0" cy="0"/>
+          <a:chOff x="0" y="0"/>
+          <a:chExt cx="0" cy="0"/>
+        </a:xfrm>
+      </p:grpSpPr>
+    </p:spTree>
+  </p:cSld>
+  <p:clrMapOvr>
+    <a:masterClrMapping/>
+  </p:clrMapOvr>
+  <p:timing>
+    <p:tnLst>
+      <p:par>
+        <p:cTn id="1" dur="indefinite" restart="never" nodeType="tmRoot"/>
+      </p:par>
+    </p:tnLst>
+  </p:timing>
+</p:sld>
+</file>
+
+<file path=ppt/slides/slide36.xml><?xml version="1.0" encoding="utf-8"?>
+<p:sld xmlns:a="http://schemas.openxmlformats.org/drawingml/2006/main" xmlns:r="http://schemas.openxmlformats.org/officeDocument/2006/relationships" xmlns:p="http://schemas.openxmlformats.org/presentationml/2006/main">
+  <p:cSld>
+    <p:spTree>
+      <p:nvGrpSpPr>
+        <p:cNvPr id="1" name=""/>
+        <p:cNvGrpSpPr/>
+        <p:nvPr/>
+      </p:nvGrpSpPr>
+      <p:grpSpPr>
+        <a:xfrm>
+          <a:off x="0" y="0"/>
+          <a:ext cx="0" cy="0"/>
+          <a:chOff x="0" y="0"/>
+          <a:chExt cx="0" cy="0"/>
+        </a:xfrm>
+      </p:grpSpPr>
+    </p:spTree>
+  </p:cSld>
+  <p:clrMapOvr>
+    <a:masterClrMapping/>
+  </p:clrMapOvr>
+  <p:timing>
+    <p:tnLst>
+      <p:par>
+        <p:cTn id="1" dur="indefinite" restart="never" nodeType="tmRoot"/>
+      </p:par>
+    </p:tnLst>
+  </p:timing>
+</p:sld>
+</file>
+
+<file path=ppt/slides/slide37.xml><?xml version="1.0" encoding="utf-8"?>
+<p:sld xmlns:a="http://schemas.openxmlformats.org/drawingml/2006/main" xmlns:r="http://schemas.openxmlformats.org/officeDocument/2006/relationships" xmlns:p="http://schemas.openxmlformats.org/presentationml/2006/main">
+  <p:cSld>
+    <p:spTree>
+      <p:nvGrpSpPr>
+        <p:cNvPr id="1" name=""/>
+        <p:cNvGrpSpPr/>
+        <p:nvPr/>
+      </p:nvGrpSpPr>
+      <p:grpSpPr>
+        <a:xfrm>
+          <a:off x="0" y="0"/>
+          <a:ext cx="0" cy="0"/>
+          <a:chOff x="0" y="0"/>
+          <a:chExt cx="0" cy="0"/>
+        </a:xfrm>
+      </p:grpSpPr>
+    </p:spTree>
+  </p:cSld>
+  <p:clrMapOvr>
+    <a:masterClrMapping/>
+  </p:clrMapOvr>
+  <p:timing>
+    <p:tnLst>
+      <p:par>
+        <p:cTn id="1" dur="indefinite" restart="never" nodeType="tmRoot"/>
+      </p:par>
+    </p:tnLst>
+  </p:timing>
+</p:sld>
+</file>
+
+<file path=ppt/slides/slide38.xml><?xml version="1.0" encoding="utf-8"?>
+<p:sld xmlns:a="http://schemas.openxmlformats.org/drawingml/2006/main" xmlns:r="http://schemas.openxmlformats.org/officeDocument/2006/relationships" xmlns:p="http://schemas.openxmlformats.org/presentationml/2006/main">
+  <p:cSld>
+    <p:spTree>
+      <p:nvGrpSpPr>
+        <p:cNvPr id="1" name=""/>
+        <p:cNvGrpSpPr/>
+        <p:nvPr/>
+      </p:nvGrpSpPr>
+      <p:grpSpPr>
+        <a:xfrm>
+          <a:off x="0" y="0"/>
+          <a:ext cx="0" cy="0"/>
+          <a:chOff x="0" y="0"/>
+          <a:chExt cx="0" cy="0"/>
+        </a:xfrm>
+      </p:grpSpPr>
+      <p:sp>
+        <p:nvSpPr>
+          <p:cNvPr id="2" name="TextBox 1"/>
+          <p:cNvSpPr txBox="1"/>
+          <p:nvPr/>
+        </p:nvSpPr>
+        <p:spPr>
+          <a:xfrm>
+            <a:off x="1619672" y="5085184"/>
+            <a:ext cx="4701928" cy="707886"/>
+          </a:xfrm>
+          <a:prstGeom prst="rect">
+            <a:avLst/>
+          </a:prstGeom>
+          <a:noFill/>
+        </p:spPr>
+        <p:txBody>
+          <a:bodyPr wrap="none" rtlCol="0">
+            <a:spAutoFit/>
+          </a:bodyPr>
+          <a:lstStyle/>
+          <a:p>
+            <a:r>
+              <a:rPr lang="en-CA" sz="4000" dirty="0" smtClean="0"/>
+              <a:t>(╯°□°）╯︵ ┻━┻</a:t>
+            </a:r>
+            <a:endParaRPr lang="en-CA" sz="4000" dirty="0"/>
+          </a:p>
+        </p:txBody>
+      </p:sp>
+    </p:spTree>
+  </p:cSld>
+  <p:clrMapOvr>
+    <a:masterClrMapping/>
+  </p:clrMapOvr>
+  <p:timing>
+    <p:tnLst>
+      <p:par>
+        <p:cTn id="1" dur="indefinite" restart="never" nodeType="tmRoot"/>
+      </p:par>
+    </p:tnLst>
+  </p:timing>
+</p:sld>
+</file>
+
+<file path=ppt/slides/slide39.xml><?xml version="1.0" encoding="utf-8"?>
+<p:sld xmlns:a="http://schemas.openxmlformats.org/drawingml/2006/main" xmlns:r="http://schemas.openxmlformats.org/officeDocument/2006/relationships" xmlns:p="http://schemas.openxmlformats.org/presentationml/2006/main">
+  <p:cSld>
+    <p:spTree>
+      <p:nvGrpSpPr>
+        <p:cNvPr id="1" name=""/>
+        <p:cNvGrpSpPr/>
+        <p:nvPr/>
+      </p:nvGrpSpPr>
+      <p:grpSpPr>
+        <a:xfrm>
+          <a:off x="0" y="0"/>
+          <a:ext cx="0" cy="0"/>
+          <a:chOff x="0" y="0"/>
+          <a:chExt cx="0" cy="0"/>
+        </a:xfrm>
+      </p:grpSpPr>
+    </p:spTree>
+  </p:cSld>
+  <p:clrMapOvr>
+    <a:masterClrMapping/>
+  </p:clrMapOvr>
+  <p:timing>
+    <p:tnLst>
+      <p:par>
+        <p:cTn id="1" dur="indefinite" restart="never" nodeType="tmRoot"/>
+      </p:par>
+    </p:tnLst>
+  </p:timing>
+</p:sld>
+</file>
+
 <file path=ppt/slides/slide4.xml><?xml version="1.0" encoding="utf-8"?>
 <p:sld xmlns:a="http://schemas.openxmlformats.org/drawingml/2006/main" xmlns:r="http://schemas.openxmlformats.org/officeDocument/2006/relationships" xmlns:p="http://schemas.openxmlformats.org/presentationml/2006/main">
   <p:cSld>
@@ -4107,6 +4336,38 @@
             </p:seq>
           </p:childTnLst>
         </p:cTn>
+      </p:par>
+    </p:tnLst>
+  </p:timing>
+</p:sld>
+</file>
+
+<file path=ppt/slides/slide40.xml><?xml version="1.0" encoding="utf-8"?>
+<p:sld xmlns:a="http://schemas.openxmlformats.org/drawingml/2006/main" xmlns:r="http://schemas.openxmlformats.org/officeDocument/2006/relationships" xmlns:p="http://schemas.openxmlformats.org/presentationml/2006/main">
+  <p:cSld>
+    <p:spTree>
+      <p:nvGrpSpPr>
+        <p:cNvPr id="1" name=""/>
+        <p:cNvGrpSpPr/>
+        <p:nvPr/>
+      </p:nvGrpSpPr>
+      <p:grpSpPr>
+        <a:xfrm>
+          <a:off x="0" y="0"/>
+          <a:ext cx="0" cy="0"/>
+          <a:chOff x="0" y="0"/>
+          <a:chExt cx="0" cy="0"/>
+        </a:xfrm>
+      </p:grpSpPr>
+    </p:spTree>
+  </p:cSld>
+  <p:clrMapOvr>
+    <a:masterClrMapping/>
+  </p:clrMapOvr>
+  <p:timing>
+    <p:tnLst>
+      <p:par>
+        <p:cTn id="1" dur="indefinite" restart="never" nodeType="tmRoot"/>
       </p:par>
     </p:tnLst>
   </p:timing>

</xml_diff>

<commit_message>
Added Houri to the Aspects drawing; Wincher no winching
</commit_message>
<xml_diff>
--- a/sketchbook.pptx
+++ b/sketchbook.pptx
@@ -45,6 +45,7 @@
     <p:sldId id="293" r:id="rId39"/>
     <p:sldId id="294" r:id="rId40"/>
     <p:sldId id="295" r:id="rId41"/>
+    <p:sldId id="296" r:id="rId42"/>
   </p:sldIdLst>
   <p:sldSz cx="9144000" cy="6858000" type="screen4x3"/>
   <p:notesSz cx="6858000" cy="9144000"/>
@@ -328,7 +329,7 @@
             <a:fld id="{54D51C8F-29A5-40B1-B56C-20C15425DA5B}" type="datetimeFigureOut">
               <a:rPr lang="en-CA" smtClean="0"/>
               <a:pPr/>
-              <a:t>2014-02-07</a:t>
+              <a:t>2014-02-10</a:t>
             </a:fld>
             <a:endParaRPr lang="en-CA"/>
           </a:p>
@@ -495,7 +496,7 @@
             <a:fld id="{54D51C8F-29A5-40B1-B56C-20C15425DA5B}" type="datetimeFigureOut">
               <a:rPr lang="en-CA" smtClean="0"/>
               <a:pPr/>
-              <a:t>2014-02-07</a:t>
+              <a:t>2014-02-10</a:t>
             </a:fld>
             <a:endParaRPr lang="en-CA"/>
           </a:p>
@@ -672,7 +673,7 @@
             <a:fld id="{54D51C8F-29A5-40B1-B56C-20C15425DA5B}" type="datetimeFigureOut">
               <a:rPr lang="en-CA" smtClean="0"/>
               <a:pPr/>
-              <a:t>2014-02-07</a:t>
+              <a:t>2014-02-10</a:t>
             </a:fld>
             <a:endParaRPr lang="en-CA"/>
           </a:p>
@@ -839,7 +840,7 @@
             <a:fld id="{54D51C8F-29A5-40B1-B56C-20C15425DA5B}" type="datetimeFigureOut">
               <a:rPr lang="en-CA" smtClean="0"/>
               <a:pPr/>
-              <a:t>2014-02-07</a:t>
+              <a:t>2014-02-10</a:t>
             </a:fld>
             <a:endParaRPr lang="en-CA"/>
           </a:p>
@@ -1082,7 +1083,7 @@
             <a:fld id="{54D51C8F-29A5-40B1-B56C-20C15425DA5B}" type="datetimeFigureOut">
               <a:rPr lang="en-CA" smtClean="0"/>
               <a:pPr/>
-              <a:t>2014-02-07</a:t>
+              <a:t>2014-02-10</a:t>
             </a:fld>
             <a:endParaRPr lang="en-CA"/>
           </a:p>
@@ -1367,7 +1368,7 @@
             <a:fld id="{54D51C8F-29A5-40B1-B56C-20C15425DA5B}" type="datetimeFigureOut">
               <a:rPr lang="en-CA" smtClean="0"/>
               <a:pPr/>
-              <a:t>2014-02-07</a:t>
+              <a:t>2014-02-10</a:t>
             </a:fld>
             <a:endParaRPr lang="en-CA"/>
           </a:p>
@@ -1786,7 +1787,7 @@
             <a:fld id="{54D51C8F-29A5-40B1-B56C-20C15425DA5B}" type="datetimeFigureOut">
               <a:rPr lang="en-CA" smtClean="0"/>
               <a:pPr/>
-              <a:t>2014-02-07</a:t>
+              <a:t>2014-02-10</a:t>
             </a:fld>
             <a:endParaRPr lang="en-CA"/>
           </a:p>
@@ -1901,7 +1902,7 @@
             <a:fld id="{54D51C8F-29A5-40B1-B56C-20C15425DA5B}" type="datetimeFigureOut">
               <a:rPr lang="en-CA" smtClean="0"/>
               <a:pPr/>
-              <a:t>2014-02-07</a:t>
+              <a:t>2014-02-10</a:t>
             </a:fld>
             <a:endParaRPr lang="en-CA"/>
           </a:p>
@@ -1993,7 +1994,7 @@
             <a:fld id="{54D51C8F-29A5-40B1-B56C-20C15425DA5B}" type="datetimeFigureOut">
               <a:rPr lang="en-CA" smtClean="0"/>
               <a:pPr/>
-              <a:t>2014-02-07</a:t>
+              <a:t>2014-02-10</a:t>
             </a:fld>
             <a:endParaRPr lang="en-CA"/>
           </a:p>
@@ -2267,7 +2268,7 @@
             <a:fld id="{54D51C8F-29A5-40B1-B56C-20C15425DA5B}" type="datetimeFigureOut">
               <a:rPr lang="en-CA" smtClean="0"/>
               <a:pPr/>
-              <a:t>2014-02-07</a:t>
+              <a:t>2014-02-10</a:t>
             </a:fld>
             <a:endParaRPr lang="en-CA"/>
           </a:p>
@@ -2517,7 +2518,7 @@
             <a:fld id="{54D51C8F-29A5-40B1-B56C-20C15425DA5B}" type="datetimeFigureOut">
               <a:rPr lang="en-CA" smtClean="0"/>
               <a:pPr/>
-              <a:t>2014-02-07</a:t>
+              <a:t>2014-02-10</a:t>
             </a:fld>
             <a:endParaRPr lang="en-CA"/>
           </a:p>
@@ -2727,7 +2728,7 @@
             <a:fld id="{54D51C8F-29A5-40B1-B56C-20C15425DA5B}" type="datetimeFigureOut">
               <a:rPr lang="en-CA" smtClean="0"/>
               <a:pPr/>
-              <a:t>2014-02-07</a:t>
+              <a:t>2014-02-10</a:t>
             </a:fld>
             <a:endParaRPr lang="en-CA"/>
           </a:p>
@@ -4343,6 +4344,38 @@
 </file>
 
 <file path=ppt/slides/slide40.xml><?xml version="1.0" encoding="utf-8"?>
+<p:sld xmlns:a="http://schemas.openxmlformats.org/drawingml/2006/main" xmlns:r="http://schemas.openxmlformats.org/officeDocument/2006/relationships" xmlns:p="http://schemas.openxmlformats.org/presentationml/2006/main">
+  <p:cSld>
+    <p:spTree>
+      <p:nvGrpSpPr>
+        <p:cNvPr id="1" name=""/>
+        <p:cNvGrpSpPr/>
+        <p:nvPr/>
+      </p:nvGrpSpPr>
+      <p:grpSpPr>
+        <a:xfrm>
+          <a:off x="0" y="0"/>
+          <a:ext cx="0" cy="0"/>
+          <a:chOff x="0" y="0"/>
+          <a:chExt cx="0" cy="0"/>
+        </a:xfrm>
+      </p:grpSpPr>
+    </p:spTree>
+  </p:cSld>
+  <p:clrMapOvr>
+    <a:masterClrMapping/>
+  </p:clrMapOvr>
+  <p:timing>
+    <p:tnLst>
+      <p:par>
+        <p:cTn id="1" dur="indefinite" restart="never" nodeType="tmRoot"/>
+      </p:par>
+    </p:tnLst>
+  </p:timing>
+</p:sld>
+</file>
+
+<file path=ppt/slides/slide41.xml><?xml version="1.0" encoding="utf-8"?>
 <p:sld xmlns:a="http://schemas.openxmlformats.org/drawingml/2006/main" xmlns:r="http://schemas.openxmlformats.org/officeDocument/2006/relationships" xmlns:p="http://schemas.openxmlformats.org/presentationml/2006/main">
   <p:cSld>
     <p:spTree>

</xml_diff>

<commit_message>
Excited for story, Say My Name
</commit_message>
<xml_diff>
--- a/sketchbook.pptx
+++ b/sketchbook.pptx
@@ -46,6 +46,11 @@
     <p:sldId id="294" r:id="rId40"/>
     <p:sldId id="295" r:id="rId41"/>
     <p:sldId id="296" r:id="rId42"/>
+    <p:sldId id="297" r:id="rId43"/>
+    <p:sldId id="298" r:id="rId44"/>
+    <p:sldId id="299" r:id="rId45"/>
+    <p:sldId id="300" r:id="rId46"/>
+    <p:sldId id="301" r:id="rId47"/>
   </p:sldIdLst>
   <p:sldSz cx="9144000" cy="6858000" type="screen4x3"/>
   <p:notesSz cx="6858000" cy="9144000"/>
@@ -329,7 +334,7 @@
             <a:fld id="{54D51C8F-29A5-40B1-B56C-20C15425DA5B}" type="datetimeFigureOut">
               <a:rPr lang="en-CA" smtClean="0"/>
               <a:pPr/>
-              <a:t>2014-02-10</a:t>
+              <a:t>2014-02-12</a:t>
             </a:fld>
             <a:endParaRPr lang="en-CA"/>
           </a:p>
@@ -496,7 +501,7 @@
             <a:fld id="{54D51C8F-29A5-40B1-B56C-20C15425DA5B}" type="datetimeFigureOut">
               <a:rPr lang="en-CA" smtClean="0"/>
               <a:pPr/>
-              <a:t>2014-02-10</a:t>
+              <a:t>2014-02-12</a:t>
             </a:fld>
             <a:endParaRPr lang="en-CA"/>
           </a:p>
@@ -673,7 +678,7 @@
             <a:fld id="{54D51C8F-29A5-40B1-B56C-20C15425DA5B}" type="datetimeFigureOut">
               <a:rPr lang="en-CA" smtClean="0"/>
               <a:pPr/>
-              <a:t>2014-02-10</a:t>
+              <a:t>2014-02-12</a:t>
             </a:fld>
             <a:endParaRPr lang="en-CA"/>
           </a:p>
@@ -840,7 +845,7 @@
             <a:fld id="{54D51C8F-29A5-40B1-B56C-20C15425DA5B}" type="datetimeFigureOut">
               <a:rPr lang="en-CA" smtClean="0"/>
               <a:pPr/>
-              <a:t>2014-02-10</a:t>
+              <a:t>2014-02-12</a:t>
             </a:fld>
             <a:endParaRPr lang="en-CA"/>
           </a:p>
@@ -1083,7 +1088,7 @@
             <a:fld id="{54D51C8F-29A5-40B1-B56C-20C15425DA5B}" type="datetimeFigureOut">
               <a:rPr lang="en-CA" smtClean="0"/>
               <a:pPr/>
-              <a:t>2014-02-10</a:t>
+              <a:t>2014-02-12</a:t>
             </a:fld>
             <a:endParaRPr lang="en-CA"/>
           </a:p>
@@ -1368,7 +1373,7 @@
             <a:fld id="{54D51C8F-29A5-40B1-B56C-20C15425DA5B}" type="datetimeFigureOut">
               <a:rPr lang="en-CA" smtClean="0"/>
               <a:pPr/>
-              <a:t>2014-02-10</a:t>
+              <a:t>2014-02-12</a:t>
             </a:fld>
             <a:endParaRPr lang="en-CA"/>
           </a:p>
@@ -1787,7 +1792,7 @@
             <a:fld id="{54D51C8F-29A5-40B1-B56C-20C15425DA5B}" type="datetimeFigureOut">
               <a:rPr lang="en-CA" smtClean="0"/>
               <a:pPr/>
-              <a:t>2014-02-10</a:t>
+              <a:t>2014-02-12</a:t>
             </a:fld>
             <a:endParaRPr lang="en-CA"/>
           </a:p>
@@ -1902,7 +1907,7 @@
             <a:fld id="{54D51C8F-29A5-40B1-B56C-20C15425DA5B}" type="datetimeFigureOut">
               <a:rPr lang="en-CA" smtClean="0"/>
               <a:pPr/>
-              <a:t>2014-02-10</a:t>
+              <a:t>2014-02-12</a:t>
             </a:fld>
             <a:endParaRPr lang="en-CA"/>
           </a:p>
@@ -1994,7 +1999,7 @@
             <a:fld id="{54D51C8F-29A5-40B1-B56C-20C15425DA5B}" type="datetimeFigureOut">
               <a:rPr lang="en-CA" smtClean="0"/>
               <a:pPr/>
-              <a:t>2014-02-10</a:t>
+              <a:t>2014-02-12</a:t>
             </a:fld>
             <a:endParaRPr lang="en-CA"/>
           </a:p>
@@ -2268,7 +2273,7 @@
             <a:fld id="{54D51C8F-29A5-40B1-B56C-20C15425DA5B}" type="datetimeFigureOut">
               <a:rPr lang="en-CA" smtClean="0"/>
               <a:pPr/>
-              <a:t>2014-02-10</a:t>
+              <a:t>2014-02-12</a:t>
             </a:fld>
             <a:endParaRPr lang="en-CA"/>
           </a:p>
@@ -2518,7 +2523,7 @@
             <a:fld id="{54D51C8F-29A5-40B1-B56C-20C15425DA5B}" type="datetimeFigureOut">
               <a:rPr lang="en-CA" smtClean="0"/>
               <a:pPr/>
-              <a:t>2014-02-10</a:t>
+              <a:t>2014-02-12</a:t>
             </a:fld>
             <a:endParaRPr lang="en-CA"/>
           </a:p>
@@ -2728,7 +2733,7 @@
             <a:fld id="{54D51C8F-29A5-40B1-B56C-20C15425DA5B}" type="datetimeFigureOut">
               <a:rPr lang="en-CA" smtClean="0"/>
               <a:pPr/>
-              <a:t>2014-02-10</a:t>
+              <a:t>2014-02-12</a:t>
             </a:fld>
             <a:endParaRPr lang="en-CA"/>
           </a:p>
@@ -4376,6 +4381,166 @@
 </file>
 
 <file path=ppt/slides/slide41.xml><?xml version="1.0" encoding="utf-8"?>
+<p:sld xmlns:a="http://schemas.openxmlformats.org/drawingml/2006/main" xmlns:r="http://schemas.openxmlformats.org/officeDocument/2006/relationships" xmlns:p="http://schemas.openxmlformats.org/presentationml/2006/main">
+  <p:cSld>
+    <p:spTree>
+      <p:nvGrpSpPr>
+        <p:cNvPr id="1" name=""/>
+        <p:cNvGrpSpPr/>
+        <p:nvPr/>
+      </p:nvGrpSpPr>
+      <p:grpSpPr>
+        <a:xfrm>
+          <a:off x="0" y="0"/>
+          <a:ext cx="0" cy="0"/>
+          <a:chOff x="0" y="0"/>
+          <a:chExt cx="0" cy="0"/>
+        </a:xfrm>
+      </p:grpSpPr>
+    </p:spTree>
+  </p:cSld>
+  <p:clrMapOvr>
+    <a:masterClrMapping/>
+  </p:clrMapOvr>
+  <p:timing>
+    <p:tnLst>
+      <p:par>
+        <p:cTn id="1" dur="indefinite" restart="never" nodeType="tmRoot"/>
+      </p:par>
+    </p:tnLst>
+  </p:timing>
+</p:sld>
+</file>
+
+<file path=ppt/slides/slide42.xml><?xml version="1.0" encoding="utf-8"?>
+<p:sld xmlns:a="http://schemas.openxmlformats.org/drawingml/2006/main" xmlns:r="http://schemas.openxmlformats.org/officeDocument/2006/relationships" xmlns:p="http://schemas.openxmlformats.org/presentationml/2006/main">
+  <p:cSld>
+    <p:spTree>
+      <p:nvGrpSpPr>
+        <p:cNvPr id="1" name=""/>
+        <p:cNvGrpSpPr/>
+        <p:nvPr/>
+      </p:nvGrpSpPr>
+      <p:grpSpPr>
+        <a:xfrm>
+          <a:off x="0" y="0"/>
+          <a:ext cx="0" cy="0"/>
+          <a:chOff x="0" y="0"/>
+          <a:chExt cx="0" cy="0"/>
+        </a:xfrm>
+      </p:grpSpPr>
+    </p:spTree>
+  </p:cSld>
+  <p:clrMapOvr>
+    <a:masterClrMapping/>
+  </p:clrMapOvr>
+  <p:timing>
+    <p:tnLst>
+      <p:par>
+        <p:cTn id="1" dur="indefinite" restart="never" nodeType="tmRoot"/>
+      </p:par>
+    </p:tnLst>
+  </p:timing>
+</p:sld>
+</file>
+
+<file path=ppt/slides/slide43.xml><?xml version="1.0" encoding="utf-8"?>
+<p:sld xmlns:a="http://schemas.openxmlformats.org/drawingml/2006/main" xmlns:r="http://schemas.openxmlformats.org/officeDocument/2006/relationships" xmlns:p="http://schemas.openxmlformats.org/presentationml/2006/main">
+  <p:cSld>
+    <p:spTree>
+      <p:nvGrpSpPr>
+        <p:cNvPr id="1" name=""/>
+        <p:cNvGrpSpPr/>
+        <p:nvPr/>
+      </p:nvGrpSpPr>
+      <p:grpSpPr>
+        <a:xfrm>
+          <a:off x="0" y="0"/>
+          <a:ext cx="0" cy="0"/>
+          <a:chOff x="0" y="0"/>
+          <a:chExt cx="0" cy="0"/>
+        </a:xfrm>
+      </p:grpSpPr>
+    </p:spTree>
+  </p:cSld>
+  <p:clrMapOvr>
+    <a:masterClrMapping/>
+  </p:clrMapOvr>
+  <p:timing>
+    <p:tnLst>
+      <p:par>
+        <p:cTn id="1" dur="indefinite" restart="never" nodeType="tmRoot"/>
+      </p:par>
+    </p:tnLst>
+  </p:timing>
+</p:sld>
+</file>
+
+<file path=ppt/slides/slide44.xml><?xml version="1.0" encoding="utf-8"?>
+<p:sld xmlns:a="http://schemas.openxmlformats.org/drawingml/2006/main" xmlns:r="http://schemas.openxmlformats.org/officeDocument/2006/relationships" xmlns:p="http://schemas.openxmlformats.org/presentationml/2006/main">
+  <p:cSld>
+    <p:spTree>
+      <p:nvGrpSpPr>
+        <p:cNvPr id="1" name=""/>
+        <p:cNvGrpSpPr/>
+        <p:nvPr/>
+      </p:nvGrpSpPr>
+      <p:grpSpPr>
+        <a:xfrm>
+          <a:off x="0" y="0"/>
+          <a:ext cx="0" cy="0"/>
+          <a:chOff x="0" y="0"/>
+          <a:chExt cx="0" cy="0"/>
+        </a:xfrm>
+      </p:grpSpPr>
+    </p:spTree>
+  </p:cSld>
+  <p:clrMapOvr>
+    <a:masterClrMapping/>
+  </p:clrMapOvr>
+  <p:timing>
+    <p:tnLst>
+      <p:par>
+        <p:cTn id="1" dur="indefinite" restart="never" nodeType="tmRoot"/>
+      </p:par>
+    </p:tnLst>
+  </p:timing>
+</p:sld>
+</file>
+
+<file path=ppt/slides/slide45.xml><?xml version="1.0" encoding="utf-8"?>
+<p:sld xmlns:a="http://schemas.openxmlformats.org/drawingml/2006/main" xmlns:r="http://schemas.openxmlformats.org/officeDocument/2006/relationships" xmlns:p="http://schemas.openxmlformats.org/presentationml/2006/main">
+  <p:cSld>
+    <p:spTree>
+      <p:nvGrpSpPr>
+        <p:cNvPr id="1" name=""/>
+        <p:cNvGrpSpPr/>
+        <p:nvPr/>
+      </p:nvGrpSpPr>
+      <p:grpSpPr>
+        <a:xfrm>
+          <a:off x="0" y="0"/>
+          <a:ext cx="0" cy="0"/>
+          <a:chOff x="0" y="0"/>
+          <a:chExt cx="0" cy="0"/>
+        </a:xfrm>
+      </p:grpSpPr>
+    </p:spTree>
+  </p:cSld>
+  <p:clrMapOvr>
+    <a:masterClrMapping/>
+  </p:clrMapOvr>
+  <p:timing>
+    <p:tnLst>
+      <p:par>
+        <p:cTn id="1" dur="indefinite" restart="never" nodeType="tmRoot"/>
+      </p:par>
+    </p:tnLst>
+  </p:timing>
+</p:sld>
+</file>
+
+<file path=ppt/slides/slide46.xml><?xml version="1.0" encoding="utf-8"?>
 <p:sld xmlns:a="http://schemas.openxmlformats.org/drawingml/2006/main" xmlns:r="http://schemas.openxmlformats.org/officeDocument/2006/relationships" xmlns:p="http://schemas.openxmlformats.org/presentationml/2006/main">
   <p:cSld>
     <p:spTree>

</xml_diff>

<commit_message>
Various sketches for Twitter
</commit_message>
<xml_diff>
--- a/sketchbook.pptx
+++ b/sketchbook.pptx
@@ -51,6 +51,12 @@
     <p:sldId id="299" r:id="rId45"/>
     <p:sldId id="300" r:id="rId46"/>
     <p:sldId id="301" r:id="rId47"/>
+    <p:sldId id="302" r:id="rId48"/>
+    <p:sldId id="303" r:id="rId49"/>
+    <p:sldId id="304" r:id="rId50"/>
+    <p:sldId id="305" r:id="rId51"/>
+    <p:sldId id="306" r:id="rId52"/>
+    <p:sldId id="307" r:id="rId53"/>
   </p:sldIdLst>
   <p:sldSz cx="9144000" cy="6858000" type="screen4x3"/>
   <p:notesSz cx="6858000" cy="9144000"/>
@@ -334,7 +340,7 @@
             <a:fld id="{54D51C8F-29A5-40B1-B56C-20C15425DA5B}" type="datetimeFigureOut">
               <a:rPr lang="en-CA" smtClean="0"/>
               <a:pPr/>
-              <a:t>2014-02-12</a:t>
+              <a:t>2014-03-04</a:t>
             </a:fld>
             <a:endParaRPr lang="en-CA"/>
           </a:p>
@@ -501,7 +507,7 @@
             <a:fld id="{54D51C8F-29A5-40B1-B56C-20C15425DA5B}" type="datetimeFigureOut">
               <a:rPr lang="en-CA" smtClean="0"/>
               <a:pPr/>
-              <a:t>2014-02-12</a:t>
+              <a:t>2014-03-04</a:t>
             </a:fld>
             <a:endParaRPr lang="en-CA"/>
           </a:p>
@@ -678,7 +684,7 @@
             <a:fld id="{54D51C8F-29A5-40B1-B56C-20C15425DA5B}" type="datetimeFigureOut">
               <a:rPr lang="en-CA" smtClean="0"/>
               <a:pPr/>
-              <a:t>2014-02-12</a:t>
+              <a:t>2014-03-04</a:t>
             </a:fld>
             <a:endParaRPr lang="en-CA"/>
           </a:p>
@@ -845,7 +851,7 @@
             <a:fld id="{54D51C8F-29A5-40B1-B56C-20C15425DA5B}" type="datetimeFigureOut">
               <a:rPr lang="en-CA" smtClean="0"/>
               <a:pPr/>
-              <a:t>2014-02-12</a:t>
+              <a:t>2014-03-04</a:t>
             </a:fld>
             <a:endParaRPr lang="en-CA"/>
           </a:p>
@@ -1088,7 +1094,7 @@
             <a:fld id="{54D51C8F-29A5-40B1-B56C-20C15425DA5B}" type="datetimeFigureOut">
               <a:rPr lang="en-CA" smtClean="0"/>
               <a:pPr/>
-              <a:t>2014-02-12</a:t>
+              <a:t>2014-03-04</a:t>
             </a:fld>
             <a:endParaRPr lang="en-CA"/>
           </a:p>
@@ -1373,7 +1379,7 @@
             <a:fld id="{54D51C8F-29A5-40B1-B56C-20C15425DA5B}" type="datetimeFigureOut">
               <a:rPr lang="en-CA" smtClean="0"/>
               <a:pPr/>
-              <a:t>2014-02-12</a:t>
+              <a:t>2014-03-04</a:t>
             </a:fld>
             <a:endParaRPr lang="en-CA"/>
           </a:p>
@@ -1792,7 +1798,7 @@
             <a:fld id="{54D51C8F-29A5-40B1-B56C-20C15425DA5B}" type="datetimeFigureOut">
               <a:rPr lang="en-CA" smtClean="0"/>
               <a:pPr/>
-              <a:t>2014-02-12</a:t>
+              <a:t>2014-03-04</a:t>
             </a:fld>
             <a:endParaRPr lang="en-CA"/>
           </a:p>
@@ -1907,7 +1913,7 @@
             <a:fld id="{54D51C8F-29A5-40B1-B56C-20C15425DA5B}" type="datetimeFigureOut">
               <a:rPr lang="en-CA" smtClean="0"/>
               <a:pPr/>
-              <a:t>2014-02-12</a:t>
+              <a:t>2014-03-04</a:t>
             </a:fld>
             <a:endParaRPr lang="en-CA"/>
           </a:p>
@@ -1999,7 +2005,7 @@
             <a:fld id="{54D51C8F-29A5-40B1-B56C-20C15425DA5B}" type="datetimeFigureOut">
               <a:rPr lang="en-CA" smtClean="0"/>
               <a:pPr/>
-              <a:t>2014-02-12</a:t>
+              <a:t>2014-03-04</a:t>
             </a:fld>
             <a:endParaRPr lang="en-CA"/>
           </a:p>
@@ -2273,7 +2279,7 @@
             <a:fld id="{54D51C8F-29A5-40B1-B56C-20C15425DA5B}" type="datetimeFigureOut">
               <a:rPr lang="en-CA" smtClean="0"/>
               <a:pPr/>
-              <a:t>2014-02-12</a:t>
+              <a:t>2014-03-04</a:t>
             </a:fld>
             <a:endParaRPr lang="en-CA"/>
           </a:p>
@@ -2523,7 +2529,7 @@
             <a:fld id="{54D51C8F-29A5-40B1-B56C-20C15425DA5B}" type="datetimeFigureOut">
               <a:rPr lang="en-CA" smtClean="0"/>
               <a:pPr/>
-              <a:t>2014-02-12</a:t>
+              <a:t>2014-03-04</a:t>
             </a:fld>
             <a:endParaRPr lang="en-CA"/>
           </a:p>
@@ -2733,7 +2739,7 @@
             <a:fld id="{54D51C8F-29A5-40B1-B56C-20C15425DA5B}" type="datetimeFigureOut">
               <a:rPr lang="en-CA" smtClean="0"/>
               <a:pPr/>
-              <a:t>2014-02-12</a:t>
+              <a:t>2014-03-04</a:t>
             </a:fld>
             <a:endParaRPr lang="en-CA"/>
           </a:p>
@@ -4572,7 +4578,199 @@
 </p:sld>
 </file>
 
+<file path=ppt/slides/slide47.xml><?xml version="1.0" encoding="utf-8"?>
+<p:sld xmlns:a="http://schemas.openxmlformats.org/drawingml/2006/main" xmlns:r="http://schemas.openxmlformats.org/officeDocument/2006/relationships" xmlns:p="http://schemas.openxmlformats.org/presentationml/2006/main">
+  <p:cSld>
+    <p:spTree>
+      <p:nvGrpSpPr>
+        <p:cNvPr id="1" name=""/>
+        <p:cNvGrpSpPr/>
+        <p:nvPr/>
+      </p:nvGrpSpPr>
+      <p:grpSpPr>
+        <a:xfrm>
+          <a:off x="0" y="0"/>
+          <a:ext cx="0" cy="0"/>
+          <a:chOff x="0" y="0"/>
+          <a:chExt cx="0" cy="0"/>
+        </a:xfrm>
+      </p:grpSpPr>
+    </p:spTree>
+  </p:cSld>
+  <p:clrMapOvr>
+    <a:masterClrMapping/>
+  </p:clrMapOvr>
+  <p:timing>
+    <p:tnLst>
+      <p:par>
+        <p:cTn id="1" dur="indefinite" restart="never" nodeType="tmRoot"/>
+      </p:par>
+    </p:tnLst>
+  </p:timing>
+</p:sld>
+</file>
+
+<file path=ppt/slides/slide48.xml><?xml version="1.0" encoding="utf-8"?>
+<p:sld xmlns:a="http://schemas.openxmlformats.org/drawingml/2006/main" xmlns:r="http://schemas.openxmlformats.org/officeDocument/2006/relationships" xmlns:p="http://schemas.openxmlformats.org/presentationml/2006/main">
+  <p:cSld>
+    <p:spTree>
+      <p:nvGrpSpPr>
+        <p:cNvPr id="1" name=""/>
+        <p:cNvGrpSpPr/>
+        <p:nvPr/>
+      </p:nvGrpSpPr>
+      <p:grpSpPr>
+        <a:xfrm>
+          <a:off x="0" y="0"/>
+          <a:ext cx="0" cy="0"/>
+          <a:chOff x="0" y="0"/>
+          <a:chExt cx="0" cy="0"/>
+        </a:xfrm>
+      </p:grpSpPr>
+    </p:spTree>
+  </p:cSld>
+  <p:clrMapOvr>
+    <a:masterClrMapping/>
+  </p:clrMapOvr>
+  <p:timing>
+    <p:tnLst>
+      <p:par>
+        <p:cTn id="1" dur="indefinite" restart="never" nodeType="tmRoot"/>
+      </p:par>
+    </p:tnLst>
+  </p:timing>
+</p:sld>
+</file>
+
+<file path=ppt/slides/slide49.xml><?xml version="1.0" encoding="utf-8"?>
+<p:sld xmlns:a="http://schemas.openxmlformats.org/drawingml/2006/main" xmlns:r="http://schemas.openxmlformats.org/officeDocument/2006/relationships" xmlns:p="http://schemas.openxmlformats.org/presentationml/2006/main">
+  <p:cSld>
+    <p:spTree>
+      <p:nvGrpSpPr>
+        <p:cNvPr id="1" name=""/>
+        <p:cNvGrpSpPr/>
+        <p:nvPr/>
+      </p:nvGrpSpPr>
+      <p:grpSpPr>
+        <a:xfrm>
+          <a:off x="0" y="0"/>
+          <a:ext cx="0" cy="0"/>
+          <a:chOff x="0" y="0"/>
+          <a:chExt cx="0" cy="0"/>
+        </a:xfrm>
+      </p:grpSpPr>
+    </p:spTree>
+  </p:cSld>
+  <p:clrMapOvr>
+    <a:masterClrMapping/>
+  </p:clrMapOvr>
+  <p:timing>
+    <p:tnLst>
+      <p:par>
+        <p:cTn id="1" dur="indefinite" restart="never" nodeType="tmRoot"/>
+      </p:par>
+    </p:tnLst>
+  </p:timing>
+</p:sld>
+</file>
+
 <file path=ppt/slides/slide5.xml><?xml version="1.0" encoding="utf-8"?>
+<p:sld xmlns:a="http://schemas.openxmlformats.org/drawingml/2006/main" xmlns:r="http://schemas.openxmlformats.org/officeDocument/2006/relationships" xmlns:p="http://schemas.openxmlformats.org/presentationml/2006/main">
+  <p:cSld>
+    <p:spTree>
+      <p:nvGrpSpPr>
+        <p:cNvPr id="1" name=""/>
+        <p:cNvGrpSpPr/>
+        <p:nvPr/>
+      </p:nvGrpSpPr>
+      <p:grpSpPr>
+        <a:xfrm>
+          <a:off x="0" y="0"/>
+          <a:ext cx="0" cy="0"/>
+          <a:chOff x="0" y="0"/>
+          <a:chExt cx="0" cy="0"/>
+        </a:xfrm>
+      </p:grpSpPr>
+    </p:spTree>
+  </p:cSld>
+  <p:clrMapOvr>
+    <a:masterClrMapping/>
+  </p:clrMapOvr>
+  <p:timing>
+    <p:tnLst>
+      <p:par>
+        <p:cTn id="1" dur="indefinite" restart="never" nodeType="tmRoot"/>
+      </p:par>
+    </p:tnLst>
+  </p:timing>
+</p:sld>
+</file>
+
+<file path=ppt/slides/slide50.xml><?xml version="1.0" encoding="utf-8"?>
+<p:sld xmlns:a="http://schemas.openxmlformats.org/drawingml/2006/main" xmlns:r="http://schemas.openxmlformats.org/officeDocument/2006/relationships" xmlns:p="http://schemas.openxmlformats.org/presentationml/2006/main">
+  <p:cSld>
+    <p:spTree>
+      <p:nvGrpSpPr>
+        <p:cNvPr id="1" name=""/>
+        <p:cNvGrpSpPr/>
+        <p:nvPr/>
+      </p:nvGrpSpPr>
+      <p:grpSpPr>
+        <a:xfrm>
+          <a:off x="0" y="0"/>
+          <a:ext cx="0" cy="0"/>
+          <a:chOff x="0" y="0"/>
+          <a:chExt cx="0" cy="0"/>
+        </a:xfrm>
+      </p:grpSpPr>
+    </p:spTree>
+  </p:cSld>
+  <p:clrMapOvr>
+    <a:masterClrMapping/>
+  </p:clrMapOvr>
+  <p:timing>
+    <p:tnLst>
+      <p:par>
+        <p:cTn id="1" dur="indefinite" restart="never" nodeType="tmRoot"/>
+      </p:par>
+    </p:tnLst>
+  </p:timing>
+</p:sld>
+</file>
+
+<file path=ppt/slides/slide51.xml><?xml version="1.0" encoding="utf-8"?>
+<p:sld xmlns:a="http://schemas.openxmlformats.org/drawingml/2006/main" xmlns:r="http://schemas.openxmlformats.org/officeDocument/2006/relationships" xmlns:p="http://schemas.openxmlformats.org/presentationml/2006/main">
+  <p:cSld>
+    <p:spTree>
+      <p:nvGrpSpPr>
+        <p:cNvPr id="1" name=""/>
+        <p:cNvGrpSpPr/>
+        <p:nvPr/>
+      </p:nvGrpSpPr>
+      <p:grpSpPr>
+        <a:xfrm>
+          <a:off x="0" y="0"/>
+          <a:ext cx="0" cy="0"/>
+          <a:chOff x="0" y="0"/>
+          <a:chExt cx="0" cy="0"/>
+        </a:xfrm>
+      </p:grpSpPr>
+    </p:spTree>
+  </p:cSld>
+  <p:clrMapOvr>
+    <a:masterClrMapping/>
+  </p:clrMapOvr>
+  <p:timing>
+    <p:tnLst>
+      <p:par>
+        <p:cTn id="1" dur="indefinite" restart="never" nodeType="tmRoot"/>
+      </p:par>
+    </p:tnLst>
+  </p:timing>
+</p:sld>
+</file>
+
+<file path=ppt/slides/slide52.xml><?xml version="1.0" encoding="utf-8"?>
 <p:sld xmlns:a="http://schemas.openxmlformats.org/drawingml/2006/main" xmlns:r="http://schemas.openxmlformats.org/officeDocument/2006/relationships" xmlns:p="http://schemas.openxmlformats.org/presentationml/2006/main">
   <p:cSld>
     <p:spTree>

</xml_diff>

<commit_message>
More sketches for Twitter, including the winner of the rock
</commit_message>
<xml_diff>
--- a/sketchbook.pptx
+++ b/sketchbook.pptx
@@ -57,6 +57,7 @@
     <p:sldId id="305" r:id="rId51"/>
     <p:sldId id="306" r:id="rId52"/>
     <p:sldId id="307" r:id="rId53"/>
+    <p:sldId id="308" r:id="rId54"/>
   </p:sldIdLst>
   <p:sldSz cx="9144000" cy="6858000" type="screen4x3"/>
   <p:notesSz cx="6858000" cy="9144000"/>
@@ -340,7 +341,7 @@
             <a:fld id="{54D51C8F-29A5-40B1-B56C-20C15425DA5B}" type="datetimeFigureOut">
               <a:rPr lang="en-CA" smtClean="0"/>
               <a:pPr/>
-              <a:t>2014-03-04</a:t>
+              <a:t>2014-03-06</a:t>
             </a:fld>
             <a:endParaRPr lang="en-CA"/>
           </a:p>
@@ -507,7 +508,7 @@
             <a:fld id="{54D51C8F-29A5-40B1-B56C-20C15425DA5B}" type="datetimeFigureOut">
               <a:rPr lang="en-CA" smtClean="0"/>
               <a:pPr/>
-              <a:t>2014-03-04</a:t>
+              <a:t>2014-03-06</a:t>
             </a:fld>
             <a:endParaRPr lang="en-CA"/>
           </a:p>
@@ -684,7 +685,7 @@
             <a:fld id="{54D51C8F-29A5-40B1-B56C-20C15425DA5B}" type="datetimeFigureOut">
               <a:rPr lang="en-CA" smtClean="0"/>
               <a:pPr/>
-              <a:t>2014-03-04</a:t>
+              <a:t>2014-03-06</a:t>
             </a:fld>
             <a:endParaRPr lang="en-CA"/>
           </a:p>
@@ -851,7 +852,7 @@
             <a:fld id="{54D51C8F-29A5-40B1-B56C-20C15425DA5B}" type="datetimeFigureOut">
               <a:rPr lang="en-CA" smtClean="0"/>
               <a:pPr/>
-              <a:t>2014-03-04</a:t>
+              <a:t>2014-03-06</a:t>
             </a:fld>
             <a:endParaRPr lang="en-CA"/>
           </a:p>
@@ -1094,7 +1095,7 @@
             <a:fld id="{54D51C8F-29A5-40B1-B56C-20C15425DA5B}" type="datetimeFigureOut">
               <a:rPr lang="en-CA" smtClean="0"/>
               <a:pPr/>
-              <a:t>2014-03-04</a:t>
+              <a:t>2014-03-06</a:t>
             </a:fld>
             <a:endParaRPr lang="en-CA"/>
           </a:p>
@@ -1379,7 +1380,7 @@
             <a:fld id="{54D51C8F-29A5-40B1-B56C-20C15425DA5B}" type="datetimeFigureOut">
               <a:rPr lang="en-CA" smtClean="0"/>
               <a:pPr/>
-              <a:t>2014-03-04</a:t>
+              <a:t>2014-03-06</a:t>
             </a:fld>
             <a:endParaRPr lang="en-CA"/>
           </a:p>
@@ -1798,7 +1799,7 @@
             <a:fld id="{54D51C8F-29A5-40B1-B56C-20C15425DA5B}" type="datetimeFigureOut">
               <a:rPr lang="en-CA" smtClean="0"/>
               <a:pPr/>
-              <a:t>2014-03-04</a:t>
+              <a:t>2014-03-06</a:t>
             </a:fld>
             <a:endParaRPr lang="en-CA"/>
           </a:p>
@@ -1913,7 +1914,7 @@
             <a:fld id="{54D51C8F-29A5-40B1-B56C-20C15425DA5B}" type="datetimeFigureOut">
               <a:rPr lang="en-CA" smtClean="0"/>
               <a:pPr/>
-              <a:t>2014-03-04</a:t>
+              <a:t>2014-03-06</a:t>
             </a:fld>
             <a:endParaRPr lang="en-CA"/>
           </a:p>
@@ -2005,7 +2006,7 @@
             <a:fld id="{54D51C8F-29A5-40B1-B56C-20C15425DA5B}" type="datetimeFigureOut">
               <a:rPr lang="en-CA" smtClean="0"/>
               <a:pPr/>
-              <a:t>2014-03-04</a:t>
+              <a:t>2014-03-06</a:t>
             </a:fld>
             <a:endParaRPr lang="en-CA"/>
           </a:p>
@@ -2279,7 +2280,7 @@
             <a:fld id="{54D51C8F-29A5-40B1-B56C-20C15425DA5B}" type="datetimeFigureOut">
               <a:rPr lang="en-CA" smtClean="0"/>
               <a:pPr/>
-              <a:t>2014-03-04</a:t>
+              <a:t>2014-03-06</a:t>
             </a:fld>
             <a:endParaRPr lang="en-CA"/>
           </a:p>
@@ -2529,7 +2530,7 @@
             <a:fld id="{54D51C8F-29A5-40B1-B56C-20C15425DA5B}" type="datetimeFigureOut">
               <a:rPr lang="en-CA" smtClean="0"/>
               <a:pPr/>
-              <a:t>2014-03-04</a:t>
+              <a:t>2014-03-06</a:t>
             </a:fld>
             <a:endParaRPr lang="en-CA"/>
           </a:p>
@@ -2739,7 +2740,7 @@
             <a:fld id="{54D51C8F-29A5-40B1-B56C-20C15425DA5B}" type="datetimeFigureOut">
               <a:rPr lang="en-CA" smtClean="0"/>
               <a:pPr/>
-              <a:t>2014-03-04</a:t>
+              <a:t>2014-03-06</a:t>
             </a:fld>
             <a:endParaRPr lang="en-CA"/>
           </a:p>
@@ -4771,6 +4772,38 @@
 </file>
 
 <file path=ppt/slides/slide52.xml><?xml version="1.0" encoding="utf-8"?>
+<p:sld xmlns:a="http://schemas.openxmlformats.org/drawingml/2006/main" xmlns:r="http://schemas.openxmlformats.org/officeDocument/2006/relationships" xmlns:p="http://schemas.openxmlformats.org/presentationml/2006/main">
+  <p:cSld>
+    <p:spTree>
+      <p:nvGrpSpPr>
+        <p:cNvPr id="1" name=""/>
+        <p:cNvGrpSpPr/>
+        <p:nvPr/>
+      </p:nvGrpSpPr>
+      <p:grpSpPr>
+        <a:xfrm>
+          <a:off x="0" y="0"/>
+          <a:ext cx="0" cy="0"/>
+          <a:chOff x="0" y="0"/>
+          <a:chExt cx="0" cy="0"/>
+        </a:xfrm>
+      </p:grpSpPr>
+    </p:spTree>
+  </p:cSld>
+  <p:clrMapOvr>
+    <a:masterClrMapping/>
+  </p:clrMapOvr>
+  <p:timing>
+    <p:tnLst>
+      <p:par>
+        <p:cTn id="1" dur="indefinite" restart="never" nodeType="tmRoot"/>
+      </p:par>
+    </p:tnLst>
+  </p:timing>
+</p:sld>
+</file>
+
+<file path=ppt/slides/slide53.xml><?xml version="1.0" encoding="utf-8"?>
 <p:sld xmlns:a="http://schemas.openxmlformats.org/drawingml/2006/main" xmlns:r="http://schemas.openxmlformats.org/officeDocument/2006/relationships" xmlns:p="http://schemas.openxmlformats.org/presentationml/2006/main">
   <p:cSld>
     <p:spTree>

</xml_diff>